<commit_message>
Added tech stuff to presentation
</commit_message>
<xml_diff>
--- a/docbase/Termin2/Termin3.pptx
+++ b/docbase/Termin2/Termin3.pptx
@@ -5,16 +5,19 @@
     <p:sldMasterId id="2147483725" r:id="rId1"/>
   </p:sldMasterIdLst>
   <p:notesMasterIdLst>
-    <p:notesMasterId r:id="rId9"/>
+    <p:notesMasterId r:id="rId12"/>
   </p:notesMasterIdLst>
   <p:sldIdLst>
     <p:sldId id="266" r:id="rId2"/>
     <p:sldId id="278" r:id="rId3"/>
-    <p:sldId id="281" r:id="rId4"/>
-    <p:sldId id="279" r:id="rId5"/>
-    <p:sldId id="280" r:id="rId6"/>
-    <p:sldId id="282" r:id="rId7"/>
-    <p:sldId id="283" r:id="rId8"/>
+    <p:sldId id="284" r:id="rId4"/>
+    <p:sldId id="285" r:id="rId5"/>
+    <p:sldId id="286" r:id="rId6"/>
+    <p:sldId id="281" r:id="rId7"/>
+    <p:sldId id="279" r:id="rId8"/>
+    <p:sldId id="280" r:id="rId9"/>
+    <p:sldId id="282" r:id="rId10"/>
+    <p:sldId id="283" r:id="rId11"/>
   </p:sldIdLst>
   <p:sldSz cx="12192000" cy="6858000"/>
   <p:notesSz cx="6858000" cy="9144000"/>
@@ -278,38 +281,37 @@
           <a:p>
             <a:pPr lvl="0"/>
             <a:r>
-              <a:rPr lang="de-DE" smtClean="0"/>
+              <a:rPr lang="de-DE"/>
               <a:t>Textmasterformat bearbeiten</a:t>
             </a:r>
           </a:p>
           <a:p>
             <a:pPr lvl="1"/>
             <a:r>
-              <a:rPr lang="de-DE" smtClean="0"/>
+              <a:rPr lang="de-DE"/>
               <a:t>Zweite Ebene</a:t>
             </a:r>
           </a:p>
           <a:p>
             <a:pPr lvl="2"/>
             <a:r>
-              <a:rPr lang="de-DE" smtClean="0"/>
+              <a:rPr lang="de-DE"/>
               <a:t>Dritte Ebene</a:t>
             </a:r>
           </a:p>
           <a:p>
             <a:pPr lvl="3"/>
             <a:r>
-              <a:rPr lang="de-DE" smtClean="0"/>
+              <a:rPr lang="de-DE"/>
               <a:t>Vierte Ebene</a:t>
             </a:r>
           </a:p>
           <a:p>
             <a:pPr lvl="4"/>
             <a:r>
-              <a:rPr lang="de-DE" smtClean="0"/>
+              <a:rPr lang="de-DE"/>
               <a:t>Fünfte Ebene</a:t>
             </a:r>
-            <a:endParaRPr lang="de-DE"/>
           </a:p>
         </p:txBody>
       </p:sp>
@@ -373,7 +375,7 @@
           <a:p>
             <a:fld id="{5E37AFB5-ADCD-4DF9-B32C-3C5BF4E069EF}" type="slidenum">
               <a:rPr lang="de-DE" smtClean="0"/>
-              <a:t>‹Nr.›</a:t>
+              <a:t>‹#›</a:t>
             </a:fld>
             <a:endParaRPr lang="de-DE"/>
           </a:p>
@@ -501,7 +503,7 @@
       </p:grpSpPr>
       <p:sp>
         <p:nvSpPr>
-          <p:cNvPr id="2" name="Folienbildplatzhalter 1"/>
+          <p:cNvPr id="2" name="Slide Image Placeholder 1"/>
           <p:cNvSpPr>
             <a:spLocks noGrp="1" noRot="1" noChangeAspect="1"/>
           </p:cNvSpPr>
@@ -513,7 +515,7 @@
       </p:sp>
       <p:sp>
         <p:nvSpPr>
-          <p:cNvPr id="3" name="Notizenplatzhalter 2"/>
+          <p:cNvPr id="3" name="Notes Placeholder 2"/>
           <p:cNvSpPr>
             <a:spLocks noGrp="1"/>
           </p:cNvSpPr>
@@ -532,7 +534,7 @@
       </p:sp>
       <p:sp>
         <p:nvSpPr>
-          <p:cNvPr id="4" name="Foliennummernplatzhalter 3"/>
+          <p:cNvPr id="4" name="Slide Number Placeholder 3"/>
           <p:cNvSpPr>
             <a:spLocks noGrp="1"/>
           </p:cNvSpPr>
@@ -547,7 +549,175 @@
           <a:p>
             <a:fld id="{5E37AFB5-ADCD-4DF9-B32C-3C5BF4E069EF}" type="slidenum">
               <a:rPr lang="de-DE" smtClean="0"/>
-              <a:t>7</a:t>
+              <a:t>2</a:t>
+            </a:fld>
+            <a:endParaRPr lang="de-DE"/>
+          </a:p>
+        </p:txBody>
+      </p:sp>
+    </p:spTree>
+    <p:extLst>
+      <p:ext uri="{BB962C8B-B14F-4D97-AF65-F5344CB8AC3E}">
+        <p14:creationId xmlns:p14="http://schemas.microsoft.com/office/powerpoint/2010/main" val="798042118"/>
+      </p:ext>
+    </p:extLst>
+  </p:cSld>
+  <p:clrMapOvr>
+    <a:masterClrMapping/>
+  </p:clrMapOvr>
+</p:notes>
+</file>
+
+<file path=ppt/notesSlides/notesSlide2.xml><?xml version="1.0" encoding="utf-8"?>
+<p:notes xmlns:a="http://schemas.openxmlformats.org/drawingml/2006/main" xmlns:r="http://schemas.openxmlformats.org/officeDocument/2006/relationships" xmlns:p="http://schemas.openxmlformats.org/presentationml/2006/main">
+  <p:cSld>
+    <p:spTree>
+      <p:nvGrpSpPr>
+        <p:cNvPr id="1" name=""/>
+        <p:cNvGrpSpPr/>
+        <p:nvPr/>
+      </p:nvGrpSpPr>
+      <p:grpSpPr>
+        <a:xfrm>
+          <a:off x="0" y="0"/>
+          <a:ext cx="0" cy="0"/>
+          <a:chOff x="0" y="0"/>
+          <a:chExt cx="0" cy="0"/>
+        </a:xfrm>
+      </p:grpSpPr>
+      <p:sp>
+        <p:nvSpPr>
+          <p:cNvPr id="2" name="Slide Image Placeholder 1"/>
+          <p:cNvSpPr>
+            <a:spLocks noGrp="1" noRot="1" noChangeAspect="1"/>
+          </p:cNvSpPr>
+          <p:nvPr>
+            <p:ph type="sldImg"/>
+          </p:nvPr>
+        </p:nvSpPr>
+        <p:spPr/>
+      </p:sp>
+      <p:sp>
+        <p:nvSpPr>
+          <p:cNvPr id="3" name="Notes Placeholder 2"/>
+          <p:cNvSpPr>
+            <a:spLocks noGrp="1"/>
+          </p:cNvSpPr>
+          <p:nvPr>
+            <p:ph type="body" idx="1"/>
+          </p:nvPr>
+        </p:nvSpPr>
+        <p:spPr/>
+        <p:txBody>
+          <a:bodyPr/>
+          <a:lstStyle/>
+          <a:p>
+            <a:endParaRPr lang="de-DE" dirty="0"/>
+          </a:p>
+        </p:txBody>
+      </p:sp>
+      <p:sp>
+        <p:nvSpPr>
+          <p:cNvPr id="4" name="Slide Number Placeholder 3"/>
+          <p:cNvSpPr>
+            <a:spLocks noGrp="1"/>
+          </p:cNvSpPr>
+          <p:nvPr>
+            <p:ph type="sldNum" sz="quarter" idx="10"/>
+          </p:nvPr>
+        </p:nvSpPr>
+        <p:spPr/>
+        <p:txBody>
+          <a:bodyPr/>
+          <a:lstStyle/>
+          <a:p>
+            <a:fld id="{5E37AFB5-ADCD-4DF9-B32C-3C5BF4E069EF}" type="slidenum">
+              <a:rPr lang="de-DE" smtClean="0"/>
+              <a:t>3</a:t>
+            </a:fld>
+            <a:endParaRPr lang="de-DE"/>
+          </a:p>
+        </p:txBody>
+      </p:sp>
+    </p:spTree>
+    <p:extLst>
+      <p:ext uri="{BB962C8B-B14F-4D97-AF65-F5344CB8AC3E}">
+        <p14:creationId xmlns:p14="http://schemas.microsoft.com/office/powerpoint/2010/main" val="98852027"/>
+      </p:ext>
+    </p:extLst>
+  </p:cSld>
+  <p:clrMapOvr>
+    <a:masterClrMapping/>
+  </p:clrMapOvr>
+</p:notes>
+</file>
+
+<file path=ppt/notesSlides/notesSlide3.xml><?xml version="1.0" encoding="utf-8"?>
+<p:notes xmlns:a="http://schemas.openxmlformats.org/drawingml/2006/main" xmlns:r="http://schemas.openxmlformats.org/officeDocument/2006/relationships" xmlns:p="http://schemas.openxmlformats.org/presentationml/2006/main">
+  <p:cSld>
+    <p:spTree>
+      <p:nvGrpSpPr>
+        <p:cNvPr id="1" name=""/>
+        <p:cNvGrpSpPr/>
+        <p:nvPr/>
+      </p:nvGrpSpPr>
+      <p:grpSpPr>
+        <a:xfrm>
+          <a:off x="0" y="0"/>
+          <a:ext cx="0" cy="0"/>
+          <a:chOff x="0" y="0"/>
+          <a:chExt cx="0" cy="0"/>
+        </a:xfrm>
+      </p:grpSpPr>
+      <p:sp>
+        <p:nvSpPr>
+          <p:cNvPr id="2" name="Folienbildplatzhalter 1"/>
+          <p:cNvSpPr>
+            <a:spLocks noGrp="1" noRot="1" noChangeAspect="1"/>
+          </p:cNvSpPr>
+          <p:nvPr>
+            <p:ph type="sldImg"/>
+          </p:nvPr>
+        </p:nvSpPr>
+        <p:spPr/>
+      </p:sp>
+      <p:sp>
+        <p:nvSpPr>
+          <p:cNvPr id="3" name="Notizenplatzhalter 2"/>
+          <p:cNvSpPr>
+            <a:spLocks noGrp="1"/>
+          </p:cNvSpPr>
+          <p:nvPr>
+            <p:ph type="body" idx="1"/>
+          </p:nvPr>
+        </p:nvSpPr>
+        <p:spPr/>
+        <p:txBody>
+          <a:bodyPr/>
+          <a:lstStyle/>
+          <a:p>
+            <a:endParaRPr lang="de-DE" dirty="0"/>
+          </a:p>
+        </p:txBody>
+      </p:sp>
+      <p:sp>
+        <p:nvSpPr>
+          <p:cNvPr id="4" name="Foliennummernplatzhalter 3"/>
+          <p:cNvSpPr>
+            <a:spLocks noGrp="1"/>
+          </p:cNvSpPr>
+          <p:nvPr>
+            <p:ph type="sldNum" sz="quarter" idx="10"/>
+          </p:nvPr>
+        </p:nvSpPr>
+        <p:spPr/>
+        <p:txBody>
+          <a:bodyPr/>
+          <a:lstStyle/>
+          <a:p>
+            <a:fld id="{5E37AFB5-ADCD-4DF9-B32C-3C5BF4E069EF}" type="slidenum">
+              <a:rPr lang="de-DE" smtClean="0"/>
+              <a:t>10</a:t>
             </a:fld>
             <a:endParaRPr lang="de-DE"/>
           </a:p>
@@ -621,7 +791,7 @@
           <a:p>
             <a:pPr algn="ctr"/>
             <a:r>
-              <a:rPr lang="de-DE" sz="11500" b="1" dirty="0" err="1" smtClean="0">
+              <a:rPr lang="de-DE" sz="11500" b="1" dirty="0" err="1">
                 <a:solidFill>
                   <a:schemeClr val="bg2">
                     <a:lumMod val="10000"/>
@@ -633,7 +803,7 @@
               <a:t>Sparkly</a:t>
             </a:r>
             <a:r>
-              <a:rPr lang="de-DE" sz="11500" b="1" dirty="0" smtClean="0">
+              <a:rPr lang="de-DE" sz="11500" b="1" dirty="0">
                 <a:solidFill>
                   <a:schemeClr val="bg2">
                     <a:lumMod val="10000"/>
@@ -645,7 +815,7 @@
               <a:t> </a:t>
             </a:r>
             <a:br>
-              <a:rPr lang="de-DE" sz="11500" b="1" dirty="0" smtClean="0">
+              <a:rPr lang="de-DE" sz="11500" b="1" dirty="0">
                 <a:solidFill>
                   <a:schemeClr val="bg2">
                     <a:lumMod val="10000"/>
@@ -656,7 +826,7 @@
               </a:rPr>
             </a:br>
             <a:r>
-              <a:rPr lang="de-DE" sz="11500" b="1" dirty="0" err="1" smtClean="0">
+              <a:rPr lang="de-DE" sz="11500" b="1" dirty="0" err="1">
                 <a:solidFill>
                   <a:schemeClr val="bg2">
                     <a:lumMod val="10000"/>
@@ -693,8 +863,8 @@
           <a:lstStyle/>
           <a:p>
             <a:pPr algn="ctr"/>
-            <a:r>
-              <a:rPr lang="de-DE" sz="3200" b="0" dirty="0" smtClean="0">
+            <a:br>
+              <a:rPr lang="de-DE" sz="3200" b="0" dirty="0">
                 <a:solidFill>
                   <a:schemeClr val="tx1">
                     <a:lumMod val="75000"/>
@@ -702,10 +872,9 @@
                   </a:schemeClr>
                 </a:solidFill>
               </a:rPr>
-              <a:t/>
-            </a:r>
-            <a:br>
-              <a:rPr lang="de-DE" sz="3200" b="0" dirty="0" smtClean="0">
+            </a:br>
+            <a:r>
+              <a:rPr lang="de-DE" sz="3200" b="0" dirty="0">
                 <a:solidFill>
                   <a:schemeClr val="tx1">
                     <a:lumMod val="75000"/>
@@ -713,23 +882,13 @@
                   </a:schemeClr>
                 </a:solidFill>
               </a:rPr>
-            </a:br>
-            <a:r>
-              <a:rPr lang="de-DE" sz="3200" b="0" dirty="0" smtClean="0">
-                <a:solidFill>
-                  <a:schemeClr val="tx1">
-                    <a:lumMod val="75000"/>
-                    <a:lumOff val="25000"/>
-                  </a:schemeClr>
-                </a:solidFill>
-              </a:rPr>
               <a:t>Webservices Projekt 2016:</a:t>
             </a:r>
           </a:p>
           <a:p>
             <a:pPr algn="ctr"/>
             <a:r>
-              <a:rPr lang="de-DE" sz="3200" b="0" dirty="0" smtClean="0">
+              <a:rPr lang="de-DE" sz="3200" b="0" dirty="0">
                 <a:solidFill>
                   <a:schemeClr val="tx1">
                     <a:lumMod val="75000"/>
@@ -752,13 +911,6 @@
   <p:clrMapOvr>
     <a:masterClrMapping/>
   </p:clrMapOvr>
-  <p:timing>
-    <p:tnLst>
-      <p:par>
-        <p:cTn id="1" dur="indefinite" restart="never" nodeType="tmRoot"/>
-      </p:par>
-    </p:tnLst>
-  </p:timing>
 </p:sldLayout>
 </file>
 
@@ -803,10 +955,9 @@
           </a:lstStyle>
           <a:p>
             <a:r>
-              <a:rPr lang="de-DE" dirty="0" smtClean="0"/>
+              <a:rPr lang="de-DE" dirty="0"/>
               <a:t>Titelmasterformat durch Klicken bearbeiten</a:t>
             </a:r>
-            <a:endParaRPr lang="de-DE" dirty="0"/>
           </a:p>
         </p:txBody>
       </p:sp>
@@ -827,38 +978,37 @@
           <a:p>
             <a:pPr lvl="0"/>
             <a:r>
-              <a:rPr lang="de-DE" smtClean="0"/>
+              <a:rPr lang="de-DE"/>
               <a:t>Textmasterformat bearbeiten</a:t>
             </a:r>
           </a:p>
           <a:p>
             <a:pPr lvl="1"/>
             <a:r>
-              <a:rPr lang="de-DE" smtClean="0"/>
+              <a:rPr lang="de-DE"/>
               <a:t>Zweite Ebene</a:t>
             </a:r>
           </a:p>
           <a:p>
             <a:pPr lvl="2"/>
             <a:r>
-              <a:rPr lang="de-DE" smtClean="0"/>
+              <a:rPr lang="de-DE"/>
               <a:t>Dritte Ebene</a:t>
             </a:r>
           </a:p>
           <a:p>
             <a:pPr lvl="3"/>
             <a:r>
-              <a:rPr lang="de-DE" smtClean="0"/>
+              <a:rPr lang="de-DE"/>
               <a:t>Vierte Ebene</a:t>
             </a:r>
           </a:p>
           <a:p>
             <a:pPr lvl="4"/>
             <a:r>
-              <a:rPr lang="de-DE" smtClean="0"/>
+              <a:rPr lang="de-DE"/>
               <a:t>Fünfte Ebene</a:t>
             </a:r>
-            <a:endParaRPr lang="de-DE"/>
           </a:p>
         </p:txBody>
       </p:sp>
@@ -890,7 +1040,7 @@
           </a:lstStyle>
           <a:p>
             <a:r>
-              <a:rPr lang="de-DE" dirty="0" smtClean="0">
+              <a:rPr lang="de-DE" dirty="0">
                 <a:solidFill>
                   <a:schemeClr val="bg1">
                     <a:lumMod val="50000"/>
@@ -900,7 +1050,7 @@
               <a:t>FH-Rosenheim| Webservices Projekt| </a:t>
             </a:r>
             <a:r>
-              <a:rPr lang="de-DE" b="1" dirty="0" err="1" smtClean="0">
+              <a:rPr lang="de-DE" b="1" dirty="0" err="1">
                 <a:solidFill>
                   <a:srgbClr val="9050C0"/>
                 </a:solidFill>
@@ -908,7 +1058,7 @@
               <a:t>Sparkly</a:t>
             </a:r>
             <a:r>
-              <a:rPr lang="de-DE" b="1" dirty="0" smtClean="0">
+              <a:rPr lang="de-DE" b="1" dirty="0">
                 <a:solidFill>
                   <a:srgbClr val="9050C0"/>
                 </a:solidFill>
@@ -916,7 +1066,7 @@
               <a:t> </a:t>
             </a:r>
             <a:r>
-              <a:rPr lang="de-DE" b="1" dirty="0" err="1" smtClean="0">
+              <a:rPr lang="de-DE" b="1" dirty="0" err="1">
                 <a:solidFill>
                   <a:srgbClr val="9050C0"/>
                 </a:solidFill>
@@ -956,7 +1106,7 @@
           <a:p>
             <a:fld id="{18109C88-7B38-4154-B915-44BB12A36FA9}" type="slidenum">
               <a:rPr lang="de-DE" smtClean="0"/>
-              <a:t>‹Nr.›</a:t>
+              <a:t>‹#›</a:t>
             </a:fld>
             <a:endParaRPr lang="de-DE"/>
           </a:p>
@@ -972,13 +1122,6 @@
   <p:clrMapOvr>
     <a:masterClrMapping/>
   </p:clrMapOvr>
-  <p:timing>
-    <p:tnLst>
-      <p:par>
-        <p:cTn id="1" dur="indefinite" restart="never" nodeType="tmRoot"/>
-      </p:par>
-    </p:tnLst>
-  </p:timing>
 </p:sldLayout>
 </file>
 
@@ -1028,10 +1171,9 @@
           </a:lstStyle>
           <a:p>
             <a:r>
-              <a:rPr lang="de-DE" dirty="0" smtClean="0"/>
+              <a:rPr lang="de-DE" dirty="0"/>
               <a:t>Titelmasterformat durch Klicken bearbeiten</a:t>
             </a:r>
-            <a:endParaRPr lang="de-DE" dirty="0"/>
           </a:p>
         </p:txBody>
       </p:sp>
@@ -1057,38 +1199,37 @@
           <a:p>
             <a:pPr lvl="0"/>
             <a:r>
-              <a:rPr lang="de-DE" smtClean="0"/>
+              <a:rPr lang="de-DE"/>
               <a:t>Textmasterformat bearbeiten</a:t>
             </a:r>
           </a:p>
           <a:p>
             <a:pPr lvl="1"/>
             <a:r>
-              <a:rPr lang="de-DE" smtClean="0"/>
+              <a:rPr lang="de-DE"/>
               <a:t>Zweite Ebene</a:t>
             </a:r>
           </a:p>
           <a:p>
             <a:pPr lvl="2"/>
             <a:r>
-              <a:rPr lang="de-DE" smtClean="0"/>
+              <a:rPr lang="de-DE"/>
               <a:t>Dritte Ebene</a:t>
             </a:r>
           </a:p>
           <a:p>
             <a:pPr lvl="3"/>
             <a:r>
-              <a:rPr lang="de-DE" smtClean="0"/>
+              <a:rPr lang="de-DE"/>
               <a:t>Vierte Ebene</a:t>
             </a:r>
           </a:p>
           <a:p>
             <a:pPr lvl="4"/>
             <a:r>
-              <a:rPr lang="de-DE" smtClean="0"/>
+              <a:rPr lang="de-DE"/>
               <a:t>Fünfte Ebene</a:t>
             </a:r>
-            <a:endParaRPr lang="de-DE"/>
           </a:p>
         </p:txBody>
       </p:sp>
@@ -1120,7 +1261,7 @@
           </a:lstStyle>
           <a:p>
             <a:r>
-              <a:rPr lang="de-DE" dirty="0" smtClean="0">
+              <a:rPr lang="de-DE" dirty="0">
                 <a:solidFill>
                   <a:schemeClr val="bg1">
                     <a:lumMod val="50000"/>
@@ -1130,7 +1271,7 @@
               <a:t>FH-Rosenheim| Webservices Projekt| </a:t>
             </a:r>
             <a:r>
-              <a:rPr lang="de-DE" b="1" dirty="0" err="1" smtClean="0">
+              <a:rPr lang="de-DE" b="1" dirty="0" err="1">
                 <a:solidFill>
                   <a:srgbClr val="9050C0"/>
                 </a:solidFill>
@@ -1138,7 +1279,7 @@
               <a:t>Sparkly</a:t>
             </a:r>
             <a:r>
-              <a:rPr lang="de-DE" b="1" dirty="0" smtClean="0">
+              <a:rPr lang="de-DE" b="1" dirty="0">
                 <a:solidFill>
                   <a:srgbClr val="9050C0"/>
                 </a:solidFill>
@@ -1146,7 +1287,7 @@
               <a:t> </a:t>
             </a:r>
             <a:r>
-              <a:rPr lang="de-DE" b="1" dirty="0" err="1" smtClean="0">
+              <a:rPr lang="de-DE" b="1" dirty="0" err="1">
                 <a:solidFill>
                   <a:srgbClr val="9050C0"/>
                 </a:solidFill>
@@ -1186,7 +1327,7 @@
           <a:p>
             <a:fld id="{18109C88-7B38-4154-B915-44BB12A36FA9}" type="slidenum">
               <a:rPr lang="de-DE" smtClean="0"/>
-              <a:t>‹Nr.›</a:t>
+              <a:t>‹#›</a:t>
             </a:fld>
             <a:endParaRPr lang="de-DE"/>
           </a:p>
@@ -1202,13 +1343,6 @@
   <p:clrMapOvr>
     <a:masterClrMapping/>
   </p:clrMapOvr>
-  <p:timing>
-    <p:tnLst>
-      <p:par>
-        <p:cTn id="1" dur="indefinite" restart="never" nodeType="tmRoot"/>
-      </p:par>
-    </p:tnLst>
-  </p:timing>
 </p:sldLayout>
 </file>
 
@@ -1246,38 +1380,37 @@
           <a:p>
             <a:pPr lvl="0"/>
             <a:r>
-              <a:rPr lang="de-DE" smtClean="0"/>
+              <a:rPr lang="de-DE"/>
               <a:t>Textmasterformat bearbeiten</a:t>
             </a:r>
           </a:p>
           <a:p>
             <a:pPr lvl="1"/>
             <a:r>
-              <a:rPr lang="de-DE" smtClean="0"/>
+              <a:rPr lang="de-DE"/>
               <a:t>Zweite Ebene</a:t>
             </a:r>
           </a:p>
           <a:p>
             <a:pPr lvl="2"/>
             <a:r>
-              <a:rPr lang="de-DE" smtClean="0"/>
+              <a:rPr lang="de-DE"/>
               <a:t>Dritte Ebene</a:t>
             </a:r>
           </a:p>
           <a:p>
             <a:pPr lvl="3"/>
             <a:r>
-              <a:rPr lang="de-DE" smtClean="0"/>
+              <a:rPr lang="de-DE"/>
               <a:t>Vierte Ebene</a:t>
             </a:r>
           </a:p>
           <a:p>
             <a:pPr lvl="4"/>
             <a:r>
-              <a:rPr lang="de-DE" smtClean="0"/>
+              <a:rPr lang="de-DE"/>
               <a:t>Fünfte Ebene</a:t>
             </a:r>
-            <a:endParaRPr lang="de-DE"/>
           </a:p>
         </p:txBody>
       </p:sp>
@@ -1305,10 +1438,9 @@
           </a:lstStyle>
           <a:p>
             <a:r>
-              <a:rPr lang="de-DE" dirty="0" smtClean="0"/>
+              <a:rPr lang="de-DE" dirty="0"/>
               <a:t>Titelmasterformat durch Klicken bearbeiten</a:t>
             </a:r>
-            <a:endParaRPr lang="de-DE" dirty="0"/>
           </a:p>
         </p:txBody>
       </p:sp>
@@ -1340,7 +1472,7 @@
           </a:lstStyle>
           <a:p>
             <a:r>
-              <a:rPr lang="de-DE" dirty="0" smtClean="0">
+              <a:rPr lang="de-DE" dirty="0">
                 <a:solidFill>
                   <a:schemeClr val="bg1">
                     <a:lumMod val="50000"/>
@@ -1350,7 +1482,7 @@
               <a:t>FH-Rosenheim| Webservices Projekt| </a:t>
             </a:r>
             <a:r>
-              <a:rPr lang="de-DE" b="1" dirty="0" err="1" smtClean="0">
+              <a:rPr lang="de-DE" b="1" dirty="0" err="1">
                 <a:solidFill>
                   <a:srgbClr val="9050C0"/>
                 </a:solidFill>
@@ -1358,7 +1490,7 @@
               <a:t>Sparkly</a:t>
             </a:r>
             <a:r>
-              <a:rPr lang="de-DE" b="1" dirty="0" smtClean="0">
+              <a:rPr lang="de-DE" b="1" dirty="0">
                 <a:solidFill>
                   <a:srgbClr val="9050C0"/>
                 </a:solidFill>
@@ -1366,7 +1498,7 @@
               <a:t> </a:t>
             </a:r>
             <a:r>
-              <a:rPr lang="de-DE" b="1" dirty="0" err="1" smtClean="0">
+              <a:rPr lang="de-DE" b="1" dirty="0" err="1">
                 <a:solidFill>
                   <a:srgbClr val="9050C0"/>
                 </a:solidFill>
@@ -1406,7 +1538,7 @@
           <a:p>
             <a:fld id="{18109C88-7B38-4154-B915-44BB12A36FA9}" type="slidenum">
               <a:rPr lang="de-DE" smtClean="0"/>
-              <a:t>‹Nr.›</a:t>
+              <a:t>‹#›</a:t>
             </a:fld>
             <a:endParaRPr lang="de-DE"/>
           </a:p>
@@ -1422,13 +1554,6 @@
   <p:clrMapOvr>
     <a:masterClrMapping/>
   </p:clrMapOvr>
-  <p:timing>
-    <p:tnLst>
-      <p:par>
-        <p:cTn id="1" dur="indefinite" restart="never" nodeType="tmRoot"/>
-      </p:par>
-    </p:tnLst>
-  </p:timing>
 </p:sldLayout>
 </file>
 
@@ -1473,10 +1598,9 @@
           </a:lstStyle>
           <a:p>
             <a:r>
-              <a:rPr lang="de-DE" dirty="0" smtClean="0"/>
+              <a:rPr lang="de-DE" dirty="0"/>
               <a:t>Titelmasterformat durch Klicken bearbeiten</a:t>
             </a:r>
-            <a:endParaRPr lang="de-DE" dirty="0"/>
           </a:p>
         </p:txBody>
       </p:sp>
@@ -1497,38 +1621,37 @@
           <a:p>
             <a:pPr lvl="0"/>
             <a:r>
-              <a:rPr lang="de-DE" dirty="0" smtClean="0"/>
+              <a:rPr lang="de-DE" dirty="0"/>
               <a:t>Textmasterformat bearbeiten</a:t>
             </a:r>
           </a:p>
           <a:p>
             <a:pPr lvl="1"/>
             <a:r>
-              <a:rPr lang="de-DE" dirty="0" smtClean="0"/>
+              <a:rPr lang="de-DE" dirty="0"/>
               <a:t>Zweite Ebene</a:t>
             </a:r>
           </a:p>
           <a:p>
             <a:pPr lvl="2"/>
             <a:r>
-              <a:rPr lang="de-DE" dirty="0" smtClean="0"/>
+              <a:rPr lang="de-DE" dirty="0"/>
               <a:t>Dritte Ebene</a:t>
             </a:r>
           </a:p>
           <a:p>
             <a:pPr lvl="3"/>
             <a:r>
-              <a:rPr lang="de-DE" dirty="0" smtClean="0"/>
+              <a:rPr lang="de-DE" dirty="0"/>
               <a:t>Vierte Ebene</a:t>
             </a:r>
           </a:p>
           <a:p>
             <a:pPr lvl="4"/>
             <a:r>
-              <a:rPr lang="de-DE" dirty="0" smtClean="0"/>
+              <a:rPr lang="de-DE" dirty="0"/>
               <a:t>Fünfte Ebene</a:t>
             </a:r>
-            <a:endParaRPr lang="de-DE" dirty="0"/>
           </a:p>
         </p:txBody>
       </p:sp>
@@ -1560,7 +1683,7 @@
           </a:lstStyle>
           <a:p>
             <a:r>
-              <a:rPr lang="de-DE" dirty="0" smtClean="0">
+              <a:rPr lang="de-DE" dirty="0">
                 <a:solidFill>
                   <a:schemeClr val="bg1">
                     <a:lumMod val="50000"/>
@@ -1570,7 +1693,7 @@
               <a:t>FH-Rosenheim| Webservices Projekt| </a:t>
             </a:r>
             <a:r>
-              <a:rPr lang="de-DE" b="1" dirty="0" err="1" smtClean="0">
+              <a:rPr lang="de-DE" b="1" dirty="0" err="1">
                 <a:solidFill>
                   <a:srgbClr val="9050C0"/>
                 </a:solidFill>
@@ -1578,7 +1701,7 @@
               <a:t>Sparkly</a:t>
             </a:r>
             <a:r>
-              <a:rPr lang="de-DE" b="1" dirty="0" smtClean="0">
+              <a:rPr lang="de-DE" b="1" dirty="0">
                 <a:solidFill>
                   <a:srgbClr val="9050C0"/>
                 </a:solidFill>
@@ -1586,7 +1709,7 @@
               <a:t> </a:t>
             </a:r>
             <a:r>
-              <a:rPr lang="de-DE" b="1" dirty="0" err="1" smtClean="0">
+              <a:rPr lang="de-DE" b="1" dirty="0" err="1">
                 <a:solidFill>
                   <a:srgbClr val="9050C0"/>
                 </a:solidFill>
@@ -1626,7 +1749,7 @@
           <a:p>
             <a:fld id="{18109C88-7B38-4154-B915-44BB12A36FA9}" type="slidenum">
               <a:rPr lang="de-DE" smtClean="0"/>
-              <a:t>‹Nr.›</a:t>
+              <a:t>‹#›</a:t>
             </a:fld>
             <a:endParaRPr lang="de-DE"/>
           </a:p>
@@ -1642,13 +1765,6 @@
   <p:clrMapOvr>
     <a:masterClrMapping/>
   </p:clrMapOvr>
-  <p:timing>
-    <p:tnLst>
-      <p:par>
-        <p:cTn id="1" dur="indefinite" restart="never" nodeType="tmRoot"/>
-      </p:par>
-    </p:tnLst>
-  </p:timing>
 </p:sldLayout>
 </file>
 
@@ -1730,10 +1846,9 @@
           </a:lstStyle>
           <a:p>
             <a:r>
-              <a:rPr lang="de-DE" dirty="0" smtClean="0"/>
+              <a:rPr lang="de-DE" dirty="0"/>
               <a:t>Titel der Folie</a:t>
             </a:r>
-            <a:endParaRPr lang="de-DE" dirty="0"/>
           </a:p>
         </p:txBody>
       </p:sp>
@@ -1747,13 +1862,6 @@
   <p:clrMapOvr>
     <a:masterClrMapping/>
   </p:clrMapOvr>
-  <p:timing>
-    <p:tnLst>
-      <p:par>
-        <p:cTn id="1" dur="indefinite" restart="never" nodeType="tmRoot"/>
-      </p:par>
-    </p:tnLst>
-  </p:timing>
 </p:sldLayout>
 </file>
 
@@ -1798,10 +1906,9 @@
           </a:lstStyle>
           <a:p>
             <a:r>
-              <a:rPr lang="de-DE" dirty="0" smtClean="0"/>
+              <a:rPr lang="de-DE" dirty="0"/>
               <a:t>Titelmasterformat durch Klicken bearbeiten</a:t>
             </a:r>
-            <a:endParaRPr lang="de-DE" dirty="0"/>
           </a:p>
         </p:txBody>
       </p:sp>
@@ -1827,38 +1934,37 @@
           <a:p>
             <a:pPr lvl="0"/>
             <a:r>
-              <a:rPr lang="de-DE" smtClean="0"/>
+              <a:rPr lang="de-DE"/>
               <a:t>Textmasterformat bearbeiten</a:t>
             </a:r>
           </a:p>
           <a:p>
             <a:pPr lvl="1"/>
             <a:r>
-              <a:rPr lang="de-DE" smtClean="0"/>
+              <a:rPr lang="de-DE"/>
               <a:t>Zweite Ebene</a:t>
             </a:r>
           </a:p>
           <a:p>
             <a:pPr lvl="2"/>
             <a:r>
-              <a:rPr lang="de-DE" smtClean="0"/>
+              <a:rPr lang="de-DE"/>
               <a:t>Dritte Ebene</a:t>
             </a:r>
           </a:p>
           <a:p>
             <a:pPr lvl="3"/>
             <a:r>
-              <a:rPr lang="de-DE" smtClean="0"/>
+              <a:rPr lang="de-DE"/>
               <a:t>Vierte Ebene</a:t>
             </a:r>
           </a:p>
           <a:p>
             <a:pPr lvl="4"/>
             <a:r>
-              <a:rPr lang="de-DE" smtClean="0"/>
+              <a:rPr lang="de-DE"/>
               <a:t>Fünfte Ebene</a:t>
             </a:r>
-            <a:endParaRPr lang="de-DE"/>
           </a:p>
         </p:txBody>
       </p:sp>
@@ -1884,38 +1990,37 @@
           <a:p>
             <a:pPr lvl="0"/>
             <a:r>
-              <a:rPr lang="de-DE" smtClean="0"/>
+              <a:rPr lang="de-DE"/>
               <a:t>Textmasterformat bearbeiten</a:t>
             </a:r>
           </a:p>
           <a:p>
             <a:pPr lvl="1"/>
             <a:r>
-              <a:rPr lang="de-DE" smtClean="0"/>
+              <a:rPr lang="de-DE"/>
               <a:t>Zweite Ebene</a:t>
             </a:r>
           </a:p>
           <a:p>
             <a:pPr lvl="2"/>
             <a:r>
-              <a:rPr lang="de-DE" smtClean="0"/>
+              <a:rPr lang="de-DE"/>
               <a:t>Dritte Ebene</a:t>
             </a:r>
           </a:p>
           <a:p>
             <a:pPr lvl="3"/>
             <a:r>
-              <a:rPr lang="de-DE" smtClean="0"/>
+              <a:rPr lang="de-DE"/>
               <a:t>Vierte Ebene</a:t>
             </a:r>
           </a:p>
           <a:p>
             <a:pPr lvl="4"/>
             <a:r>
-              <a:rPr lang="de-DE" smtClean="0"/>
+              <a:rPr lang="de-DE"/>
               <a:t>Fünfte Ebene</a:t>
             </a:r>
-            <a:endParaRPr lang="de-DE"/>
           </a:p>
         </p:txBody>
       </p:sp>
@@ -1947,7 +2052,7 @@
           </a:lstStyle>
           <a:p>
             <a:r>
-              <a:rPr lang="de-DE" dirty="0" smtClean="0">
+              <a:rPr lang="de-DE" dirty="0">
                 <a:solidFill>
                   <a:schemeClr val="bg1">
                     <a:lumMod val="50000"/>
@@ -1957,7 +2062,7 @@
               <a:t>FH-Rosenheim| Webservices Projekt| </a:t>
             </a:r>
             <a:r>
-              <a:rPr lang="de-DE" b="1" dirty="0" err="1" smtClean="0">
+              <a:rPr lang="de-DE" b="1" dirty="0" err="1">
                 <a:solidFill>
                   <a:srgbClr val="9050C0"/>
                 </a:solidFill>
@@ -1965,7 +2070,7 @@
               <a:t>Sparkly</a:t>
             </a:r>
             <a:r>
-              <a:rPr lang="de-DE" b="1" dirty="0" smtClean="0">
+              <a:rPr lang="de-DE" b="1" dirty="0">
                 <a:solidFill>
                   <a:srgbClr val="9050C0"/>
                 </a:solidFill>
@@ -1973,7 +2078,7 @@
               <a:t> </a:t>
             </a:r>
             <a:r>
-              <a:rPr lang="de-DE" b="1" dirty="0" err="1" smtClean="0">
+              <a:rPr lang="de-DE" b="1" dirty="0" err="1">
                 <a:solidFill>
                   <a:srgbClr val="9050C0"/>
                 </a:solidFill>
@@ -2013,7 +2118,7 @@
           <a:p>
             <a:fld id="{18109C88-7B38-4154-B915-44BB12A36FA9}" type="slidenum">
               <a:rPr lang="de-DE" smtClean="0"/>
-              <a:t>‹Nr.›</a:t>
+              <a:t>‹#›</a:t>
             </a:fld>
             <a:endParaRPr lang="de-DE"/>
           </a:p>
@@ -2029,13 +2134,6 @@
   <p:clrMapOvr>
     <a:masterClrMapping/>
   </p:clrMapOvr>
-  <p:timing>
-    <p:tnLst>
-      <p:par>
-        <p:cTn id="1" dur="indefinite" restart="never" nodeType="tmRoot"/>
-      </p:par>
-    </p:tnLst>
-  </p:timing>
 </p:sldLayout>
 </file>
 
@@ -2085,10 +2183,9 @@
           </a:lstStyle>
           <a:p>
             <a:r>
-              <a:rPr lang="de-DE" dirty="0" smtClean="0"/>
+              <a:rPr lang="de-DE" dirty="0"/>
               <a:t>Titelmasterformat durch Klicken bearbeiten</a:t>
             </a:r>
-            <a:endParaRPr lang="de-DE" dirty="0"/>
           </a:p>
         </p:txBody>
       </p:sp>
@@ -2151,7 +2248,7 @@
           <a:p>
             <a:pPr lvl="0"/>
             <a:r>
-              <a:rPr lang="de-DE" smtClean="0"/>
+              <a:rPr lang="de-DE"/>
               <a:t>Textmasterformat bearbeiten</a:t>
             </a:r>
           </a:p>
@@ -2179,38 +2276,37 @@
           <a:p>
             <a:pPr lvl="0"/>
             <a:r>
-              <a:rPr lang="de-DE" smtClean="0"/>
+              <a:rPr lang="de-DE"/>
               <a:t>Textmasterformat bearbeiten</a:t>
             </a:r>
           </a:p>
           <a:p>
             <a:pPr lvl="1"/>
             <a:r>
-              <a:rPr lang="de-DE" smtClean="0"/>
+              <a:rPr lang="de-DE"/>
               <a:t>Zweite Ebene</a:t>
             </a:r>
           </a:p>
           <a:p>
             <a:pPr lvl="2"/>
             <a:r>
-              <a:rPr lang="de-DE" smtClean="0"/>
+              <a:rPr lang="de-DE"/>
               <a:t>Dritte Ebene</a:t>
             </a:r>
           </a:p>
           <a:p>
             <a:pPr lvl="3"/>
             <a:r>
-              <a:rPr lang="de-DE" smtClean="0"/>
+              <a:rPr lang="de-DE"/>
               <a:t>Vierte Ebene</a:t>
             </a:r>
           </a:p>
           <a:p>
             <a:pPr lvl="4"/>
             <a:r>
-              <a:rPr lang="de-DE" smtClean="0"/>
+              <a:rPr lang="de-DE"/>
               <a:t>Fünfte Ebene</a:t>
             </a:r>
-            <a:endParaRPr lang="de-DE"/>
           </a:p>
         </p:txBody>
       </p:sp>
@@ -2273,7 +2369,7 @@
           <a:p>
             <a:pPr lvl="0"/>
             <a:r>
-              <a:rPr lang="de-DE" smtClean="0"/>
+              <a:rPr lang="de-DE"/>
               <a:t>Textmasterformat bearbeiten</a:t>
             </a:r>
           </a:p>
@@ -2301,38 +2397,37 @@
           <a:p>
             <a:pPr lvl="0"/>
             <a:r>
-              <a:rPr lang="de-DE" smtClean="0"/>
+              <a:rPr lang="de-DE"/>
               <a:t>Textmasterformat bearbeiten</a:t>
             </a:r>
           </a:p>
           <a:p>
             <a:pPr lvl="1"/>
             <a:r>
-              <a:rPr lang="de-DE" smtClean="0"/>
+              <a:rPr lang="de-DE"/>
               <a:t>Zweite Ebene</a:t>
             </a:r>
           </a:p>
           <a:p>
             <a:pPr lvl="2"/>
             <a:r>
-              <a:rPr lang="de-DE" smtClean="0"/>
+              <a:rPr lang="de-DE"/>
               <a:t>Dritte Ebene</a:t>
             </a:r>
           </a:p>
           <a:p>
             <a:pPr lvl="3"/>
             <a:r>
-              <a:rPr lang="de-DE" smtClean="0"/>
+              <a:rPr lang="de-DE"/>
               <a:t>Vierte Ebene</a:t>
             </a:r>
           </a:p>
           <a:p>
             <a:pPr lvl="4"/>
             <a:r>
-              <a:rPr lang="de-DE" smtClean="0"/>
+              <a:rPr lang="de-DE"/>
               <a:t>Fünfte Ebene</a:t>
             </a:r>
-            <a:endParaRPr lang="de-DE"/>
           </a:p>
         </p:txBody>
       </p:sp>
@@ -2364,7 +2459,7 @@
           </a:lstStyle>
           <a:p>
             <a:r>
-              <a:rPr lang="de-DE" dirty="0" smtClean="0">
+              <a:rPr lang="de-DE" dirty="0">
                 <a:solidFill>
                   <a:schemeClr val="bg1">
                     <a:lumMod val="50000"/>
@@ -2374,7 +2469,7 @@
               <a:t>FH-Rosenheim| Webservices Projekt| </a:t>
             </a:r>
             <a:r>
-              <a:rPr lang="de-DE" b="1" dirty="0" err="1" smtClean="0">
+              <a:rPr lang="de-DE" b="1" dirty="0" err="1">
                 <a:solidFill>
                   <a:srgbClr val="9050C0"/>
                 </a:solidFill>
@@ -2382,7 +2477,7 @@
               <a:t>Sparkly</a:t>
             </a:r>
             <a:r>
-              <a:rPr lang="de-DE" b="1" dirty="0" smtClean="0">
+              <a:rPr lang="de-DE" b="1" dirty="0">
                 <a:solidFill>
                   <a:srgbClr val="9050C0"/>
                 </a:solidFill>
@@ -2390,7 +2485,7 @@
               <a:t> </a:t>
             </a:r>
             <a:r>
-              <a:rPr lang="de-DE" b="1" dirty="0" err="1" smtClean="0">
+              <a:rPr lang="de-DE" b="1" dirty="0" err="1">
                 <a:solidFill>
                   <a:srgbClr val="9050C0"/>
                 </a:solidFill>
@@ -2430,7 +2525,7 @@
           <a:p>
             <a:fld id="{18109C88-7B38-4154-B915-44BB12A36FA9}" type="slidenum">
               <a:rPr lang="de-DE" smtClean="0"/>
-              <a:t>‹Nr.›</a:t>
+              <a:t>‹#›</a:t>
             </a:fld>
             <a:endParaRPr lang="de-DE"/>
           </a:p>
@@ -2446,13 +2541,6 @@
   <p:clrMapOvr>
     <a:masterClrMapping/>
   </p:clrMapOvr>
-  <p:timing>
-    <p:tnLst>
-      <p:par>
-        <p:cTn id="1" dur="indefinite" restart="never" nodeType="tmRoot"/>
-      </p:par>
-    </p:tnLst>
-  </p:timing>
 </p:sldLayout>
 </file>
 
@@ -2497,10 +2585,9 @@
           </a:lstStyle>
           <a:p>
             <a:r>
-              <a:rPr lang="de-DE" dirty="0" smtClean="0"/>
+              <a:rPr lang="de-DE" dirty="0"/>
               <a:t>Titelmasterformat durch Klicken bearbeiten</a:t>
             </a:r>
-            <a:endParaRPr lang="de-DE" dirty="0"/>
           </a:p>
         </p:txBody>
       </p:sp>
@@ -2532,7 +2619,7 @@
           </a:lstStyle>
           <a:p>
             <a:r>
-              <a:rPr lang="de-DE" dirty="0" smtClean="0">
+              <a:rPr lang="de-DE" dirty="0">
                 <a:solidFill>
                   <a:schemeClr val="bg1">
                     <a:lumMod val="50000"/>
@@ -2542,7 +2629,7 @@
               <a:t>FH-Rosenheim| Webservices Projekt| </a:t>
             </a:r>
             <a:r>
-              <a:rPr lang="de-DE" b="1" dirty="0" err="1" smtClean="0">
+              <a:rPr lang="de-DE" b="1" dirty="0" err="1">
                 <a:solidFill>
                   <a:srgbClr val="9050C0"/>
                 </a:solidFill>
@@ -2550,7 +2637,7 @@
               <a:t>Sparkly</a:t>
             </a:r>
             <a:r>
-              <a:rPr lang="de-DE" b="1" dirty="0" smtClean="0">
+              <a:rPr lang="de-DE" b="1" dirty="0">
                 <a:solidFill>
                   <a:srgbClr val="9050C0"/>
                 </a:solidFill>
@@ -2558,7 +2645,7 @@
               <a:t> </a:t>
             </a:r>
             <a:r>
-              <a:rPr lang="de-DE" b="1" dirty="0" err="1" smtClean="0">
+              <a:rPr lang="de-DE" b="1" dirty="0" err="1">
                 <a:solidFill>
                   <a:srgbClr val="9050C0"/>
                 </a:solidFill>
@@ -2598,7 +2685,7 @@
           <a:p>
             <a:fld id="{18109C88-7B38-4154-B915-44BB12A36FA9}" type="slidenum">
               <a:rPr lang="de-DE" smtClean="0"/>
-              <a:t>‹Nr.›</a:t>
+              <a:t>‹#›</a:t>
             </a:fld>
             <a:endParaRPr lang="de-DE"/>
           </a:p>
@@ -2614,13 +2701,6 @@
   <p:clrMapOvr>
     <a:masterClrMapping/>
   </p:clrMapOvr>
-  <p:timing>
-    <p:tnLst>
-      <p:par>
-        <p:cTn id="1" dur="indefinite" restart="never" nodeType="tmRoot"/>
-      </p:par>
-    </p:tnLst>
-  </p:timing>
 </p:sldLayout>
 </file>
 
@@ -2696,10 +2776,9 @@
           <a:lstStyle/>
           <a:p>
             <a:r>
-              <a:rPr lang="de-DE" smtClean="0"/>
+              <a:rPr lang="de-DE"/>
               <a:t>FH Rosenheim – Webservices Projekt</a:t>
             </a:r>
-            <a:endParaRPr lang="de-DE"/>
           </a:p>
         </p:txBody>
       </p:sp>
@@ -2728,7 +2807,7 @@
           <a:p>
             <a:fld id="{18109C88-7B38-4154-B915-44BB12A36FA9}" type="slidenum">
               <a:rPr lang="de-DE" smtClean="0"/>
-              <a:t>‹Nr.›</a:t>
+              <a:t>‹#›</a:t>
             </a:fld>
             <a:endParaRPr lang="de-DE"/>
           </a:p>
@@ -2744,13 +2823,6 @@
   <p:clrMapOvr>
     <a:masterClrMapping/>
   </p:clrMapOvr>
-  <p:timing>
-    <p:tnLst>
-      <p:par>
-        <p:cTn id="1" dur="indefinite" restart="never" nodeType="tmRoot"/>
-      </p:par>
-    </p:tnLst>
-  </p:timing>
 </p:sldLayout>
 </file>
 
@@ -2800,10 +2872,9 @@
           </a:lstStyle>
           <a:p>
             <a:r>
-              <a:rPr lang="de-DE" dirty="0" smtClean="0"/>
+              <a:rPr lang="de-DE" dirty="0"/>
               <a:t>Titelmasterformat durch Klicken bearbeiten</a:t>
             </a:r>
-            <a:endParaRPr lang="de-DE" dirty="0"/>
           </a:p>
         </p:txBody>
       </p:sp>
@@ -2857,38 +2928,37 @@
           <a:p>
             <a:pPr lvl="0"/>
             <a:r>
-              <a:rPr lang="de-DE" smtClean="0"/>
+              <a:rPr lang="de-DE"/>
               <a:t>Textmasterformat bearbeiten</a:t>
             </a:r>
           </a:p>
           <a:p>
             <a:pPr lvl="1"/>
             <a:r>
-              <a:rPr lang="de-DE" smtClean="0"/>
+              <a:rPr lang="de-DE"/>
               <a:t>Zweite Ebene</a:t>
             </a:r>
           </a:p>
           <a:p>
             <a:pPr lvl="2"/>
             <a:r>
-              <a:rPr lang="de-DE" smtClean="0"/>
+              <a:rPr lang="de-DE"/>
               <a:t>Dritte Ebene</a:t>
             </a:r>
           </a:p>
           <a:p>
             <a:pPr lvl="3"/>
             <a:r>
-              <a:rPr lang="de-DE" smtClean="0"/>
+              <a:rPr lang="de-DE"/>
               <a:t>Vierte Ebene</a:t>
             </a:r>
           </a:p>
           <a:p>
             <a:pPr lvl="4"/>
             <a:r>
-              <a:rPr lang="de-DE" smtClean="0"/>
+              <a:rPr lang="de-DE"/>
               <a:t>Fünfte Ebene</a:t>
             </a:r>
-            <a:endParaRPr lang="de-DE"/>
           </a:p>
         </p:txBody>
       </p:sp>
@@ -2951,7 +3021,7 @@
           <a:p>
             <a:pPr lvl="0"/>
             <a:r>
-              <a:rPr lang="de-DE" smtClean="0"/>
+              <a:rPr lang="de-DE"/>
               <a:t>Textmasterformat bearbeiten</a:t>
             </a:r>
           </a:p>
@@ -2985,7 +3055,7 @@
           </a:lstStyle>
           <a:p>
             <a:r>
-              <a:rPr lang="de-DE" dirty="0" smtClean="0">
+              <a:rPr lang="de-DE" dirty="0">
                 <a:solidFill>
                   <a:schemeClr val="bg1">
                     <a:lumMod val="50000"/>
@@ -2995,7 +3065,7 @@
               <a:t>FH-Rosenheim| Webservices Projekt| </a:t>
             </a:r>
             <a:r>
-              <a:rPr lang="de-DE" b="1" dirty="0" err="1" smtClean="0">
+              <a:rPr lang="de-DE" b="1" dirty="0" err="1">
                 <a:solidFill>
                   <a:srgbClr val="9050C0"/>
                 </a:solidFill>
@@ -3003,7 +3073,7 @@
               <a:t>Sparkly</a:t>
             </a:r>
             <a:r>
-              <a:rPr lang="de-DE" b="1" dirty="0" smtClean="0">
+              <a:rPr lang="de-DE" b="1" dirty="0">
                 <a:solidFill>
                   <a:srgbClr val="9050C0"/>
                 </a:solidFill>
@@ -3011,7 +3081,7 @@
               <a:t> </a:t>
             </a:r>
             <a:r>
-              <a:rPr lang="de-DE" b="1" dirty="0" err="1" smtClean="0">
+              <a:rPr lang="de-DE" b="1" dirty="0" err="1">
                 <a:solidFill>
                   <a:srgbClr val="9050C0"/>
                 </a:solidFill>
@@ -3051,7 +3121,7 @@
           <a:p>
             <a:fld id="{18109C88-7B38-4154-B915-44BB12A36FA9}" type="slidenum">
               <a:rPr lang="de-DE" smtClean="0"/>
-              <a:t>‹Nr.›</a:t>
+              <a:t>‹#›</a:t>
             </a:fld>
             <a:endParaRPr lang="de-DE"/>
           </a:p>
@@ -3067,13 +3137,6 @@
   <p:clrMapOvr>
     <a:masterClrMapping/>
   </p:clrMapOvr>
-  <p:timing>
-    <p:tnLst>
-      <p:par>
-        <p:cTn id="1" dur="indefinite" restart="never" nodeType="tmRoot"/>
-      </p:par>
-    </p:tnLst>
-  </p:timing>
 </p:sldLayout>
 </file>
 
@@ -3123,10 +3186,9 @@
           </a:lstStyle>
           <a:p>
             <a:r>
-              <a:rPr lang="de-DE" dirty="0" smtClean="0"/>
+              <a:rPr lang="de-DE" dirty="0"/>
               <a:t>Titelmasterformat durch Klicken bearbeiten</a:t>
             </a:r>
-            <a:endParaRPr lang="de-DE" dirty="0"/>
           </a:p>
         </p:txBody>
       </p:sp>
@@ -3250,7 +3312,7 @@
           <a:p>
             <a:pPr lvl="0"/>
             <a:r>
-              <a:rPr lang="de-DE" smtClean="0"/>
+              <a:rPr lang="de-DE"/>
               <a:t>Textmasterformat bearbeiten</a:t>
             </a:r>
           </a:p>
@@ -3284,7 +3346,7 @@
           </a:lstStyle>
           <a:p>
             <a:r>
-              <a:rPr lang="de-DE" dirty="0" smtClean="0">
+              <a:rPr lang="de-DE" dirty="0">
                 <a:solidFill>
                   <a:schemeClr val="bg1">
                     <a:lumMod val="50000"/>
@@ -3294,7 +3356,7 @@
               <a:t>FH-Rosenheim| Webservices Projekt| </a:t>
             </a:r>
             <a:r>
-              <a:rPr lang="de-DE" b="1" dirty="0" err="1" smtClean="0">
+              <a:rPr lang="de-DE" b="1" dirty="0" err="1">
                 <a:solidFill>
                   <a:srgbClr val="9050C0"/>
                 </a:solidFill>
@@ -3302,7 +3364,7 @@
               <a:t>Sparkly</a:t>
             </a:r>
             <a:r>
-              <a:rPr lang="de-DE" b="1" dirty="0" smtClean="0">
+              <a:rPr lang="de-DE" b="1" dirty="0">
                 <a:solidFill>
                   <a:srgbClr val="9050C0"/>
                 </a:solidFill>
@@ -3310,7 +3372,7 @@
               <a:t> </a:t>
             </a:r>
             <a:r>
-              <a:rPr lang="de-DE" b="1" dirty="0" err="1" smtClean="0">
+              <a:rPr lang="de-DE" b="1" dirty="0" err="1">
                 <a:solidFill>
                   <a:srgbClr val="9050C0"/>
                 </a:solidFill>
@@ -3350,7 +3412,7 @@
           <a:p>
             <a:fld id="{18109C88-7B38-4154-B915-44BB12A36FA9}" type="slidenum">
               <a:rPr lang="de-DE" smtClean="0"/>
-              <a:t>‹Nr.›</a:t>
+              <a:t>‹#›</a:t>
             </a:fld>
             <a:endParaRPr lang="de-DE"/>
           </a:p>
@@ -3366,13 +3428,6 @@
   <p:clrMapOvr>
     <a:masterClrMapping/>
   </p:clrMapOvr>
-  <p:timing>
-    <p:tnLst>
-      <p:par>
-        <p:cTn id="1" dur="indefinite" restart="never" nodeType="tmRoot"/>
-      </p:par>
-    </p:tnLst>
-  </p:timing>
 </p:sldLayout>
 </file>
 
@@ -3427,10 +3482,9 @@
           <a:lstStyle/>
           <a:p>
             <a:r>
-              <a:rPr lang="de-DE" dirty="0" smtClean="0"/>
+              <a:rPr lang="de-DE" dirty="0"/>
               <a:t>Titelmasterformat durch Klicken bearbeiten</a:t>
             </a:r>
-            <a:endParaRPr lang="de-DE" dirty="0"/>
           </a:p>
         </p:txBody>
       </p:sp>
@@ -3461,38 +3515,37 @@
           <a:p>
             <a:pPr lvl="0"/>
             <a:r>
-              <a:rPr lang="de-DE" smtClean="0"/>
+              <a:rPr lang="de-DE"/>
               <a:t>Textmasterformat bearbeiten</a:t>
             </a:r>
           </a:p>
           <a:p>
             <a:pPr lvl="1"/>
             <a:r>
-              <a:rPr lang="de-DE" smtClean="0"/>
+              <a:rPr lang="de-DE"/>
               <a:t>Zweite Ebene</a:t>
             </a:r>
           </a:p>
           <a:p>
             <a:pPr lvl="2"/>
             <a:r>
-              <a:rPr lang="de-DE" smtClean="0"/>
+              <a:rPr lang="de-DE"/>
               <a:t>Dritte Ebene</a:t>
             </a:r>
           </a:p>
           <a:p>
             <a:pPr lvl="3"/>
             <a:r>
-              <a:rPr lang="de-DE" smtClean="0"/>
+              <a:rPr lang="de-DE"/>
               <a:t>Vierte Ebene</a:t>
             </a:r>
           </a:p>
           <a:p>
             <a:pPr lvl="4"/>
             <a:r>
-              <a:rPr lang="de-DE" smtClean="0"/>
+              <a:rPr lang="de-DE"/>
               <a:t>Fünfte Ebene</a:t>
             </a:r>
-            <a:endParaRPr lang="de-DE"/>
           </a:p>
         </p:txBody>
       </p:sp>
@@ -3524,7 +3577,7 @@
           </a:lstStyle>
           <a:p>
             <a:r>
-              <a:rPr lang="de-DE" dirty="0" smtClean="0">
+              <a:rPr lang="de-DE" dirty="0">
                 <a:solidFill>
                   <a:schemeClr val="bg1">
                     <a:lumMod val="50000"/>
@@ -3534,7 +3587,7 @@
               <a:t>FH-Rosenheim| Webservices Projekt| </a:t>
             </a:r>
             <a:r>
-              <a:rPr lang="de-DE" b="1" dirty="0" err="1" smtClean="0">
+              <a:rPr lang="de-DE" b="1" dirty="0" err="1">
                 <a:solidFill>
                   <a:srgbClr val="F38DB9"/>
                 </a:solidFill>
@@ -3542,7 +3595,7 @@
               <a:t>Sparkly</a:t>
             </a:r>
             <a:r>
-              <a:rPr lang="de-DE" b="1" dirty="0" smtClean="0">
+              <a:rPr lang="de-DE" b="1" dirty="0">
                 <a:solidFill>
                   <a:srgbClr val="F38DB9"/>
                 </a:solidFill>
@@ -3550,7 +3603,7 @@
               <a:t> </a:t>
             </a:r>
             <a:r>
-              <a:rPr lang="de-DE" b="1" dirty="0" err="1" smtClean="0">
+              <a:rPr lang="de-DE" b="1" dirty="0" err="1">
                 <a:solidFill>
                   <a:srgbClr val="F38DB9"/>
                 </a:solidFill>
@@ -3601,7 +3654,7 @@
             <a:fld id="{18109C88-7B38-4154-B915-44BB12A36FA9}" type="slidenum">
               <a:rPr lang="de-DE" smtClean="0"/>
               <a:pPr/>
-              <a:t>‹Nr.›</a:t>
+              <a:t>‹#›</a:t>
             </a:fld>
             <a:endParaRPr lang="de-DE" dirty="0"/>
           </a:p>
@@ -3629,13 +3682,6 @@
     <p:sldLayoutId id="2147483736" r:id="rId11"/>
     <p:sldLayoutId id="2147483650" r:id="rId12"/>
   </p:sldLayoutIdLst>
-  <p:timing>
-    <p:tnLst>
-      <p:par>
-        <p:cTn id="1" dur="indefinite" restart="never" nodeType="tmRoot"/>
-      </p:par>
-    </p:tnLst>
-  </p:timing>
   <p:hf hdr="0"/>
   <p:txStyles>
     <p:titleStyle>
@@ -4011,10 +4057,10 @@
                 <a:latin typeface="Arial Black" panose="020B0A04020102020204" pitchFamily="34" charset="0"/>
                 <a:cs typeface="Aharoni" panose="02010803020104030203" pitchFamily="2" charset="-79"/>
               </a:rPr>
-              <a:t>S</a:t>
-            </a:r>
-            <a:r>
-              <a:rPr lang="de-DE" sz="11500" b="1" dirty="0" err="1" smtClean="0">
+              <a:t>Sparkly</a:t>
+            </a:r>
+            <a:r>
+              <a:rPr lang="de-DE" sz="11500" b="1" dirty="0">
                 <a:solidFill>
                   <a:schemeClr val="bg2">
                     <a:lumMod val="10000"/>
@@ -4023,10 +4069,10 @@
                 <a:latin typeface="Arial Black" panose="020B0A04020102020204" pitchFamily="34" charset="0"/>
                 <a:cs typeface="Aharoni" panose="02010803020104030203" pitchFamily="2" charset="-79"/>
               </a:rPr>
-              <a:t>parkly</a:t>
-            </a:r>
-            <a:r>
-              <a:rPr lang="de-DE" sz="11500" b="1" dirty="0" smtClean="0">
+              <a:t> </a:t>
+            </a:r>
+            <a:br>
+              <a:rPr lang="de-DE" sz="11500" b="1" dirty="0">
                 <a:solidFill>
                   <a:schemeClr val="bg2">
                     <a:lumMod val="10000"/>
@@ -4035,21 +4081,9 @@
                 <a:latin typeface="Arial Black" panose="020B0A04020102020204" pitchFamily="34" charset="0"/>
                 <a:cs typeface="Aharoni" panose="02010803020104030203" pitchFamily="2" charset="-79"/>
               </a:rPr>
-              <a:t> </a:t>
-            </a:r>
-            <a:br>
-              <a:rPr lang="de-DE" sz="11500" b="1" dirty="0" smtClean="0">
-                <a:solidFill>
-                  <a:schemeClr val="bg2">
-                    <a:lumMod val="10000"/>
-                  </a:schemeClr>
-                </a:solidFill>
-                <a:latin typeface="Arial Black" panose="020B0A04020102020204" pitchFamily="34" charset="0"/>
-                <a:cs typeface="Aharoni" panose="02010803020104030203" pitchFamily="2" charset="-79"/>
-              </a:rPr>
             </a:br>
             <a:r>
-              <a:rPr lang="de-DE" sz="11500" b="1" dirty="0" err="1" smtClean="0">
+              <a:rPr lang="de-DE" sz="11500" b="1" dirty="0" err="1">
                 <a:solidFill>
                   <a:schemeClr val="bg2">
                     <a:lumMod val="10000"/>
@@ -4095,8 +4129,8 @@
           <a:lstStyle/>
           <a:p>
             <a:pPr algn="ctr"/>
-            <a:r>
-              <a:rPr lang="de-DE" sz="3200" dirty="0" smtClean="0">
+            <a:br>
+              <a:rPr lang="de-DE" sz="3200" dirty="0">
                 <a:solidFill>
                   <a:schemeClr val="tx1">
                     <a:lumMod val="75000"/>
@@ -4104,10 +4138,9 @@
                   </a:schemeClr>
                 </a:solidFill>
               </a:rPr>
-              <a:t/>
-            </a:r>
-            <a:br>
-              <a:rPr lang="de-DE" sz="3200" dirty="0" smtClean="0">
+            </a:br>
+            <a:r>
+              <a:rPr lang="de-DE" sz="3200" dirty="0">
                 <a:solidFill>
                   <a:schemeClr val="tx1">
                     <a:lumMod val="75000"/>
@@ -4115,16 +4148,6 @@
                   </a:schemeClr>
                 </a:solidFill>
               </a:rPr>
-            </a:br>
-            <a:r>
-              <a:rPr lang="de-DE" sz="3200" dirty="0" smtClean="0">
-                <a:solidFill>
-                  <a:schemeClr val="tx1">
-                    <a:lumMod val="75000"/>
-                    <a:lumOff val="25000"/>
-                  </a:schemeClr>
-                </a:solidFill>
-              </a:rPr>
               <a:t>Webservices Projekt 2016:</a:t>
             </a:r>
           </a:p>
@@ -4133,7 +4156,7 @@
               <a:buNone/>
             </a:pPr>
             <a:r>
-              <a:rPr lang="de-DE" sz="3200" dirty="0" smtClean="0">
+              <a:rPr lang="de-DE" sz="3200" dirty="0">
                 <a:solidFill>
                   <a:schemeClr val="tx1">
                     <a:lumMod val="75000"/>
@@ -4263,7 +4286,7 @@
           <a:p>
             <a:pPr algn="ctr"/>
             <a:r>
-              <a:rPr lang="de-DE" dirty="0" smtClean="0">
+              <a:rPr lang="de-DE" dirty="0">
                 <a:solidFill>
                   <a:schemeClr val="bg1"/>
                 </a:solidFill>
@@ -4271,7 +4294,7 @@
               <a:t>Manuel </a:t>
             </a:r>
             <a:r>
-              <a:rPr lang="de-DE" dirty="0" err="1" smtClean="0">
+              <a:rPr lang="de-DE" dirty="0" err="1">
                 <a:solidFill>
                   <a:schemeClr val="bg1"/>
                 </a:solidFill>
@@ -4279,7 +4302,7 @@
               <a:t>Huber|Franziska</a:t>
             </a:r>
             <a:r>
-              <a:rPr lang="de-DE" dirty="0" smtClean="0">
+              <a:rPr lang="de-DE" dirty="0">
                 <a:solidFill>
                   <a:schemeClr val="bg1"/>
                 </a:solidFill>
@@ -4304,13 +4327,129 @@
   <p:clrMapOvr>
     <a:masterClrMapping/>
   </p:clrMapOvr>
-  <p:timing>
-    <p:tnLst>
-      <p:par>
-        <p:cTn id="1" dur="indefinite" restart="never" nodeType="tmRoot"/>
-      </p:par>
-    </p:tnLst>
-  </p:timing>
+</p:sld>
+</file>
+
+<file path=ppt/slides/slide10.xml><?xml version="1.0" encoding="utf-8"?>
+<p:sld xmlns:a="http://schemas.openxmlformats.org/drawingml/2006/main" xmlns:r="http://schemas.openxmlformats.org/officeDocument/2006/relationships" xmlns:p="http://schemas.openxmlformats.org/presentationml/2006/main">
+  <p:cSld>
+    <p:spTree>
+      <p:nvGrpSpPr>
+        <p:cNvPr id="1" name=""/>
+        <p:cNvGrpSpPr/>
+        <p:nvPr/>
+      </p:nvGrpSpPr>
+      <p:grpSpPr>
+        <a:xfrm>
+          <a:off x="0" y="0"/>
+          <a:ext cx="0" cy="0"/>
+          <a:chOff x="0" y="0"/>
+          <a:chExt cx="0" cy="0"/>
+        </a:xfrm>
+      </p:grpSpPr>
+      <p:pic>
+        <p:nvPicPr>
+          <p:cNvPr id="7" name="Inhaltsplatzhalter 6"/>
+          <p:cNvPicPr>
+            <a:picLocks noGrp="1" noChangeAspect="1"/>
+          </p:cNvPicPr>
+          <p:nvPr>
+            <p:ph idx="1"/>
+          </p:nvPr>
+        </p:nvPicPr>
+        <p:blipFill>
+          <a:blip r:embed="rId3">
+            <a:extLst>
+              <a:ext uri="{28A0092B-C50C-407E-A947-70E740481C1C}">
+                <a14:useLocalDpi xmlns:a14="http://schemas.microsoft.com/office/drawing/2010/main" val="0"/>
+              </a:ext>
+            </a:extLst>
+          </a:blip>
+          <a:stretch>
+            <a:fillRect/>
+          </a:stretch>
+        </p:blipFill>
+        <p:spPr>
+          <a:xfrm>
+            <a:off x="1842381" y="170358"/>
+            <a:ext cx="8262203" cy="5694313"/>
+          </a:xfrm>
+        </p:spPr>
+      </p:pic>
+      <p:sp>
+        <p:nvSpPr>
+          <p:cNvPr id="4" name="Fußzeilenplatzhalter 3"/>
+          <p:cNvSpPr>
+            <a:spLocks noGrp="1"/>
+          </p:cNvSpPr>
+          <p:nvPr>
+            <p:ph type="ftr" sz="quarter" idx="11"/>
+          </p:nvPr>
+        </p:nvSpPr>
+        <p:spPr/>
+        <p:txBody>
+          <a:bodyPr/>
+          <a:lstStyle/>
+          <a:p>
+            <a:r>
+              <a:rPr lang="de-DE">
+                <a:solidFill>
+                  <a:schemeClr val="bg1">
+                    <a:lumMod val="50000"/>
+                  </a:schemeClr>
+                </a:solidFill>
+              </a:rPr>
+              <a:t>FH-Rosenheim| Webservices Projekt| </a:t>
+            </a:r>
+            <a:r>
+              <a:rPr lang="de-DE" b="1">
+                <a:solidFill>
+                  <a:srgbClr val="9050C0"/>
+                </a:solidFill>
+              </a:rPr>
+              <a:t>Sparkly Unicorns</a:t>
+            </a:r>
+            <a:endParaRPr lang="de-DE" b="1" dirty="0">
+              <a:solidFill>
+                <a:srgbClr val="9050C0"/>
+              </a:solidFill>
+            </a:endParaRPr>
+          </a:p>
+        </p:txBody>
+      </p:sp>
+      <p:sp>
+        <p:nvSpPr>
+          <p:cNvPr id="5" name="Foliennummernplatzhalter 4"/>
+          <p:cNvSpPr>
+            <a:spLocks noGrp="1"/>
+          </p:cNvSpPr>
+          <p:nvPr>
+            <p:ph type="sldNum" sz="quarter" idx="12"/>
+          </p:nvPr>
+        </p:nvSpPr>
+        <p:spPr/>
+        <p:txBody>
+          <a:bodyPr/>
+          <a:lstStyle/>
+          <a:p>
+            <a:fld id="{18109C88-7B38-4154-B915-44BB12A36FA9}" type="slidenum">
+              <a:rPr lang="de-DE" smtClean="0"/>
+              <a:t>10</a:t>
+            </a:fld>
+            <a:endParaRPr lang="de-DE"/>
+          </a:p>
+        </p:txBody>
+      </p:sp>
+    </p:spTree>
+    <p:extLst>
+      <p:ext uri="{BB962C8B-B14F-4D97-AF65-F5344CB8AC3E}">
+        <p14:creationId xmlns:p14="http://schemas.microsoft.com/office/powerpoint/2010/main" val="155766070"/>
+      </p:ext>
+    </p:extLst>
+  </p:cSld>
+  <p:clrMapOvr>
+    <a:masterClrMapping/>
+  </p:clrMapOvr>
 </p:sld>
 </file>
 
@@ -4347,21 +4486,76 @@
           <a:lstStyle/>
           <a:p>
             <a:r>
-              <a:rPr lang="de-DE" dirty="0" smtClean="0"/>
+              <a:rPr lang="de-DE" dirty="0"/>
               <a:t>Agenda</a:t>
             </a:r>
+          </a:p>
+        </p:txBody>
+      </p:sp>
+      <p:sp>
+        <p:nvSpPr>
+          <p:cNvPr id="3" name="Inhaltsplatzhalter 2"/>
+          <p:cNvSpPr>
+            <a:spLocks noGrp="1"/>
+          </p:cNvSpPr>
+          <p:nvPr>
+            <p:ph idx="1"/>
+          </p:nvPr>
+        </p:nvSpPr>
+        <p:spPr/>
+        <p:txBody>
+          <a:bodyPr/>
+          <a:lstStyle/>
+          <a:p>
+            <a:r>
+              <a:rPr lang="de-DE" dirty="0"/>
+              <a:t>Architektur</a:t>
+            </a:r>
+          </a:p>
+          <a:p>
+            <a:r>
+              <a:rPr lang="de-DE" dirty="0"/>
+              <a:t>Schnittstellen</a:t>
+            </a:r>
+          </a:p>
+          <a:p>
+            <a:r>
+              <a:rPr lang="de-DE" dirty="0" err="1"/>
+              <a:t>Use</a:t>
+            </a:r>
+            <a:r>
+              <a:rPr lang="de-DE" dirty="0"/>
+              <a:t>-Case Diagramme</a:t>
+            </a:r>
+          </a:p>
+          <a:p>
+            <a:r>
+              <a:rPr lang="de-DE" dirty="0"/>
+              <a:t>Dialoglandkarte</a:t>
+            </a:r>
+          </a:p>
+          <a:p>
+            <a:r>
+              <a:rPr lang="de-DE" dirty="0"/>
+              <a:t>Roadmap</a:t>
+            </a:r>
+          </a:p>
+          <a:p>
             <a:endParaRPr lang="de-DE" dirty="0"/>
           </a:p>
-        </p:txBody>
-      </p:sp>
-      <p:sp>
-        <p:nvSpPr>
-          <p:cNvPr id="3" name="Inhaltsplatzhalter 2"/>
-          <p:cNvSpPr>
-            <a:spLocks noGrp="1"/>
-          </p:cNvSpPr>
-          <p:nvPr>
-            <p:ph idx="1"/>
+          <a:p>
+            <a:endParaRPr lang="de-DE" dirty="0"/>
+          </a:p>
+        </p:txBody>
+      </p:sp>
+      <p:sp>
+        <p:nvSpPr>
+          <p:cNvPr id="4" name="Fußzeilenplatzhalter 3"/>
+          <p:cNvSpPr>
+            <a:spLocks noGrp="1"/>
+          </p:cNvSpPr>
+          <p:nvPr>
+            <p:ph type="ftr" sz="quarter" idx="11"/>
           </p:nvPr>
         </p:nvSpPr>
         <p:spPr/>
@@ -4370,67 +4564,7 @@
           <a:lstStyle/>
           <a:p>
             <a:r>
-              <a:rPr lang="de-DE" dirty="0" smtClean="0"/>
-              <a:t>Architektur</a:t>
-            </a:r>
-            <a:endParaRPr lang="de-DE" dirty="0"/>
-          </a:p>
-          <a:p>
-            <a:r>
-              <a:rPr lang="de-DE" dirty="0" smtClean="0"/>
-              <a:t>Schnittstellen</a:t>
-            </a:r>
-          </a:p>
-          <a:p>
-            <a:r>
-              <a:rPr lang="de-DE" dirty="0" err="1" smtClean="0"/>
-              <a:t>Use</a:t>
-            </a:r>
-            <a:r>
-              <a:rPr lang="de-DE" dirty="0" smtClean="0"/>
-              <a:t>-Case Diagramme</a:t>
-            </a:r>
-            <a:endParaRPr lang="de-DE" dirty="0"/>
-          </a:p>
-          <a:p>
-            <a:r>
-              <a:rPr lang="de-DE" dirty="0" smtClean="0"/>
-              <a:t>Dialoglandkarte</a:t>
-            </a:r>
-            <a:endParaRPr lang="de-DE" dirty="0" smtClean="0"/>
-          </a:p>
-          <a:p>
-            <a:r>
-              <a:rPr lang="de-DE" dirty="0" smtClean="0"/>
-              <a:t>Roadmap</a:t>
-            </a:r>
-            <a:endParaRPr lang="de-DE" dirty="0"/>
-          </a:p>
-          <a:p>
-            <a:endParaRPr lang="de-DE" dirty="0"/>
-          </a:p>
-          <a:p>
-            <a:endParaRPr lang="de-DE" dirty="0"/>
-          </a:p>
-        </p:txBody>
-      </p:sp>
-      <p:sp>
-        <p:nvSpPr>
-          <p:cNvPr id="4" name="Fußzeilenplatzhalter 3"/>
-          <p:cNvSpPr>
-            <a:spLocks noGrp="1"/>
-          </p:cNvSpPr>
-          <p:nvPr>
-            <p:ph type="ftr" sz="quarter" idx="11"/>
-          </p:nvPr>
-        </p:nvSpPr>
-        <p:spPr/>
-        <p:txBody>
-          <a:bodyPr/>
-          <a:lstStyle/>
-          <a:p>
-            <a:r>
-              <a:rPr lang="de-DE" smtClean="0">
+              <a:rPr lang="de-DE">
                 <a:solidFill>
                   <a:schemeClr val="bg1">
                     <a:lumMod val="50000"/>
@@ -4440,7 +4574,7 @@
               <a:t>FH-Rosenheim| Webservices Projekt| </a:t>
             </a:r>
             <a:r>
-              <a:rPr lang="de-DE" b="1" smtClean="0">
+              <a:rPr lang="de-DE" b="1">
                 <a:solidFill>
                   <a:srgbClr val="9050C0"/>
                 </a:solidFill>
@@ -4488,13 +4622,6 @@
   <p:clrMapOvr>
     <a:masterClrMapping/>
   </p:clrMapOvr>
-  <p:timing>
-    <p:tnLst>
-      <p:par>
-        <p:cTn id="1" dur="indefinite" restart="never" nodeType="tmRoot"/>
-      </p:par>
-    </p:tnLst>
-  </p:timing>
 </p:sld>
 </file>
 
@@ -4517,7 +4644,7 @@
       </p:grpSpPr>
       <p:sp>
         <p:nvSpPr>
-          <p:cNvPr id="6" name="Titel 5"/>
+          <p:cNvPr id="2" name="Title 1"/>
           <p:cNvSpPr>
             <a:spLocks noGrp="1"/>
           </p:cNvSpPr>
@@ -4525,23 +4652,14 @@
             <p:ph type="title"/>
           </p:nvPr>
         </p:nvSpPr>
-        <p:spPr>
-          <a:xfrm>
-            <a:off x="1066800" y="3058767"/>
-            <a:ext cx="10233999" cy="1325563"/>
-          </a:xfrm>
-        </p:spPr>
+        <p:spPr/>
         <p:txBody>
           <a:bodyPr/>
           <a:lstStyle/>
           <a:p>
             <a:r>
-              <a:rPr lang="de-DE" dirty="0" err="1" smtClean="0"/>
-              <a:t>Use</a:t>
-            </a:r>
-            <a:r>
-              <a:rPr lang="de-DE" dirty="0" smtClean="0"/>
-              <a:t>-Case Diagramme</a:t>
+              <a:rPr lang="en-GB" dirty="0" err="1"/>
+              <a:t>Architektur</a:t>
             </a:r>
             <a:endParaRPr lang="de-DE" dirty="0"/>
           </a:p>
@@ -4549,26 +4667,21 @@
       </p:sp>
       <p:sp>
         <p:nvSpPr>
-          <p:cNvPr id="4" name="Fußzeilenplatzhalter 3"/>
-          <p:cNvSpPr>
-            <a:spLocks noGrp="1"/>
-          </p:cNvSpPr>
-          <p:nvPr>
-            <p:ph type="ftr" sz="quarter" idx="4294967295"/>
-          </p:nvPr>
-        </p:nvSpPr>
-        <p:spPr>
-          <a:xfrm>
-            <a:off x="0" y="6356350"/>
-            <a:ext cx="4114800" cy="365125"/>
-          </a:xfrm>
-        </p:spPr>
+          <p:cNvPr id="4" name="Footer Placeholder 3"/>
+          <p:cNvSpPr>
+            <a:spLocks noGrp="1"/>
+          </p:cNvSpPr>
+          <p:nvPr>
+            <p:ph type="ftr" sz="quarter" idx="11"/>
+          </p:nvPr>
+        </p:nvSpPr>
+        <p:spPr/>
         <p:txBody>
           <a:bodyPr/>
           <a:lstStyle/>
           <a:p>
             <a:r>
-              <a:rPr lang="de-DE" smtClean="0">
+              <a:rPr lang="de-DE">
                 <a:solidFill>
                   <a:schemeClr val="bg1">
                     <a:lumMod val="50000"/>
@@ -4578,7 +4691,7 @@
               <a:t>FH-Rosenheim| Webservices Projekt| </a:t>
             </a:r>
             <a:r>
-              <a:rPr lang="de-DE" b="1" smtClean="0">
+              <a:rPr lang="de-DE" b="1">
                 <a:solidFill>
                   <a:srgbClr val="9050C0"/>
                 </a:solidFill>
@@ -4595,20 +4708,15 @@
       </p:sp>
       <p:sp>
         <p:nvSpPr>
-          <p:cNvPr id="5" name="Foliennummernplatzhalter 4"/>
-          <p:cNvSpPr>
-            <a:spLocks noGrp="1"/>
-          </p:cNvSpPr>
-          <p:nvPr>
-            <p:ph type="sldNum" sz="quarter" idx="4294967295"/>
-          </p:nvPr>
-        </p:nvSpPr>
-        <p:spPr>
-          <a:xfrm>
-            <a:off x="9448800" y="6356350"/>
-            <a:ext cx="2743200" cy="365125"/>
-          </a:xfrm>
-        </p:spPr>
+          <p:cNvPr id="5" name="Slide Number Placeholder 4"/>
+          <p:cNvSpPr>
+            <a:spLocks noGrp="1"/>
+          </p:cNvSpPr>
+          <p:nvPr>
+            <p:ph type="sldNum" sz="quarter" idx="12"/>
+          </p:nvPr>
+        </p:nvSpPr>
+        <p:spPr/>
         <p:txBody>
           <a:bodyPr/>
           <a:lstStyle/>
@@ -4621,23 +4729,113 @@
           </a:p>
         </p:txBody>
       </p:sp>
+      <p:pic>
+        <p:nvPicPr>
+          <p:cNvPr id="7" name="Picture 6"/>
+          <p:cNvPicPr>
+            <a:picLocks noChangeAspect="1"/>
+          </p:cNvPicPr>
+          <p:nvPr/>
+        </p:nvPicPr>
+        <p:blipFill>
+          <a:blip r:embed="rId3">
+            <a:extLst>
+              <a:ext uri="{28A0092B-C50C-407E-A947-70E740481C1C}">
+                <a14:useLocalDpi xmlns:a14="http://schemas.microsoft.com/office/drawing/2010/main" val="0"/>
+              </a:ext>
+            </a:extLst>
+          </a:blip>
+          <a:stretch>
+            <a:fillRect/>
+          </a:stretch>
+        </p:blipFill>
+        <p:spPr>
+          <a:xfrm>
+            <a:off x="5312420" y="112857"/>
+            <a:ext cx="5624021" cy="6608618"/>
+          </a:xfrm>
+          <a:prstGeom prst="rect">
+            <a:avLst/>
+          </a:prstGeom>
+        </p:spPr>
+      </p:pic>
+      <p:sp>
+        <p:nvSpPr>
+          <p:cNvPr id="11" name="Content Placeholder 2"/>
+          <p:cNvSpPr>
+            <a:spLocks noGrp="1"/>
+          </p:cNvSpPr>
+          <p:nvPr>
+            <p:ph idx="1"/>
+          </p:nvPr>
+        </p:nvSpPr>
+        <p:spPr>
+          <a:xfrm>
+            <a:off x="838200" y="1825625"/>
+            <a:ext cx="4222173" cy="4351338"/>
+          </a:xfrm>
+        </p:spPr>
+        <p:txBody>
+          <a:bodyPr/>
+          <a:lstStyle/>
+          <a:p>
+            <a:r>
+              <a:rPr lang="en-GB" dirty="0"/>
+              <a:t>Server:</a:t>
+            </a:r>
+          </a:p>
+          <a:p>
+            <a:pPr lvl="1"/>
+            <a:r>
+              <a:rPr lang="en-GB" dirty="0"/>
+              <a:t>MySQL</a:t>
+            </a:r>
+          </a:p>
+          <a:p>
+            <a:pPr lvl="1"/>
+            <a:r>
+              <a:rPr lang="en-GB" dirty="0"/>
+              <a:t>C# </a:t>
+            </a:r>
+            <a:r>
+              <a:rPr lang="en-GB" dirty="0" err="1"/>
+              <a:t>WebApi</a:t>
+            </a:r>
+            <a:endParaRPr lang="en-GB" dirty="0"/>
+          </a:p>
+          <a:p>
+            <a:r>
+              <a:rPr lang="en-GB" dirty="0"/>
+              <a:t>Frontend:</a:t>
+            </a:r>
+          </a:p>
+          <a:p>
+            <a:pPr lvl="1"/>
+            <a:r>
+              <a:rPr lang="en-GB" dirty="0"/>
+              <a:t>Angular2 (Typescript)</a:t>
+            </a:r>
+          </a:p>
+          <a:p>
+            <a:pPr lvl="1"/>
+            <a:r>
+              <a:rPr lang="en-GB" dirty="0" err="1"/>
+              <a:t>Webpack</a:t>
+            </a:r>
+            <a:endParaRPr lang="de-DE" dirty="0"/>
+          </a:p>
+        </p:txBody>
+      </p:sp>
     </p:spTree>
     <p:extLst>
       <p:ext uri="{BB962C8B-B14F-4D97-AF65-F5344CB8AC3E}">
-        <p14:creationId xmlns:p14="http://schemas.microsoft.com/office/powerpoint/2010/main" val="989500410"/>
+        <p14:creationId xmlns:p14="http://schemas.microsoft.com/office/powerpoint/2010/main" val="2141388855"/>
       </p:ext>
     </p:extLst>
   </p:cSld>
   <p:clrMapOvr>
     <a:masterClrMapping/>
   </p:clrMapOvr>
-  <p:timing>
-    <p:tnLst>
-      <p:par>
-        <p:cTn id="1" dur="indefinite" restart="never" nodeType="tmRoot"/>
-      </p:par>
-    </p:tnLst>
-  </p:timing>
 </p:sld>
 </file>
 
@@ -4660,7 +4858,7 @@
       </p:grpSpPr>
       <p:pic>
         <p:nvPicPr>
-          <p:cNvPr id="6" name="Inhaltsplatzhalter 5"/>
+          <p:cNvPr id="15" name="Content Placeholder 14"/>
           <p:cNvPicPr>
             <a:picLocks noGrp="1" noChangeAspect="1"/>
           </p:cNvPicPr>
@@ -4682,14 +4880,14 @@
         </p:blipFill>
         <p:spPr>
           <a:xfrm>
-            <a:off x="2463640" y="412318"/>
-            <a:ext cx="7518560" cy="5944032"/>
+            <a:off x="2895600" y="365125"/>
+            <a:ext cx="7389972" cy="6023948"/>
           </a:xfrm>
         </p:spPr>
       </p:pic>
       <p:sp>
         <p:nvSpPr>
-          <p:cNvPr id="4" name="Fußzeilenplatzhalter 3"/>
+          <p:cNvPr id="4" name="Footer Placeholder 3"/>
           <p:cNvSpPr>
             <a:spLocks noGrp="1"/>
           </p:cNvSpPr>
@@ -4703,7 +4901,7 @@
           <a:lstStyle/>
           <a:p>
             <a:r>
-              <a:rPr lang="de-DE" smtClean="0">
+              <a:rPr lang="de-DE">
                 <a:solidFill>
                   <a:schemeClr val="bg1">
                     <a:lumMod val="50000"/>
@@ -4713,7 +4911,7 @@
               <a:t>FH-Rosenheim| Webservices Projekt| </a:t>
             </a:r>
             <a:r>
-              <a:rPr lang="de-DE" b="1" smtClean="0">
+              <a:rPr lang="de-DE" b="1">
                 <a:solidFill>
                   <a:srgbClr val="9050C0"/>
                 </a:solidFill>
@@ -4730,7 +4928,7 @@
       </p:sp>
       <p:sp>
         <p:nvSpPr>
-          <p:cNvPr id="5" name="Foliennummernplatzhalter 4"/>
+          <p:cNvPr id="5" name="Slide Number Placeholder 4"/>
           <p:cNvSpPr>
             <a:spLocks noGrp="1"/>
           </p:cNvSpPr>
@@ -4754,24 +4952,275 @@
     </p:spTree>
     <p:extLst>
       <p:ext uri="{BB962C8B-B14F-4D97-AF65-F5344CB8AC3E}">
-        <p14:creationId xmlns:p14="http://schemas.microsoft.com/office/powerpoint/2010/main" val="795551646"/>
+        <p14:creationId xmlns:p14="http://schemas.microsoft.com/office/powerpoint/2010/main" val="1474141783"/>
       </p:ext>
     </p:extLst>
   </p:cSld>
   <p:clrMapOvr>
     <a:masterClrMapping/>
   </p:clrMapOvr>
-  <p:timing>
-    <p:tnLst>
-      <p:par>
-        <p:cTn id="1" dur="indefinite" restart="never" nodeType="tmRoot"/>
-      </p:par>
-    </p:tnLst>
-  </p:timing>
 </p:sld>
 </file>
 
 <file path=ppt/slides/slide5.xml><?xml version="1.0" encoding="utf-8"?>
+<p:sld xmlns:a="http://schemas.openxmlformats.org/drawingml/2006/main" xmlns:r="http://schemas.openxmlformats.org/officeDocument/2006/relationships" xmlns:p="http://schemas.openxmlformats.org/presentationml/2006/main">
+  <p:cSld>
+    <p:spTree>
+      <p:nvGrpSpPr>
+        <p:cNvPr id="1" name=""/>
+        <p:cNvGrpSpPr/>
+        <p:nvPr/>
+      </p:nvGrpSpPr>
+      <p:grpSpPr>
+        <a:xfrm>
+          <a:off x="0" y="0"/>
+          <a:ext cx="0" cy="0"/>
+          <a:chOff x="0" y="0"/>
+          <a:chExt cx="0" cy="0"/>
+        </a:xfrm>
+      </p:grpSpPr>
+      <p:sp>
+        <p:nvSpPr>
+          <p:cNvPr id="5" name="Footer Placeholder 4"/>
+          <p:cNvSpPr>
+            <a:spLocks noGrp="1"/>
+          </p:cNvSpPr>
+          <p:nvPr>
+            <p:ph type="ftr" sz="quarter" idx="11"/>
+          </p:nvPr>
+        </p:nvSpPr>
+        <p:spPr/>
+        <p:txBody>
+          <a:bodyPr/>
+          <a:lstStyle/>
+          <a:p>
+            <a:r>
+              <a:rPr lang="de-DE">
+                <a:solidFill>
+                  <a:schemeClr val="bg1">
+                    <a:lumMod val="50000"/>
+                  </a:schemeClr>
+                </a:solidFill>
+              </a:rPr>
+              <a:t>FH-Rosenheim| Webservices Projekt| </a:t>
+            </a:r>
+            <a:r>
+              <a:rPr lang="de-DE" b="1">
+                <a:solidFill>
+                  <a:srgbClr val="9050C0"/>
+                </a:solidFill>
+              </a:rPr>
+              <a:t>Sparkly Unicorns</a:t>
+            </a:r>
+            <a:endParaRPr lang="de-DE" b="1" dirty="0">
+              <a:solidFill>
+                <a:srgbClr val="9050C0"/>
+              </a:solidFill>
+            </a:endParaRPr>
+          </a:p>
+        </p:txBody>
+      </p:sp>
+      <p:sp>
+        <p:nvSpPr>
+          <p:cNvPr id="6" name="Slide Number Placeholder 5"/>
+          <p:cNvSpPr>
+            <a:spLocks noGrp="1"/>
+          </p:cNvSpPr>
+          <p:nvPr>
+            <p:ph type="sldNum" sz="quarter" idx="12"/>
+          </p:nvPr>
+        </p:nvSpPr>
+        <p:spPr/>
+        <p:txBody>
+          <a:bodyPr/>
+          <a:lstStyle/>
+          <a:p>
+            <a:fld id="{18109C88-7B38-4154-B915-44BB12A36FA9}" type="slidenum">
+              <a:rPr lang="de-DE" smtClean="0"/>
+              <a:t>5</a:t>
+            </a:fld>
+            <a:endParaRPr lang="de-DE"/>
+          </a:p>
+        </p:txBody>
+      </p:sp>
+      <p:pic>
+        <p:nvPicPr>
+          <p:cNvPr id="9" name="Content Placeholder 13"/>
+          <p:cNvPicPr>
+            <a:picLocks noGrp="1" noChangeAspect="1"/>
+          </p:cNvPicPr>
+          <p:nvPr>
+            <p:ph idx="1"/>
+          </p:nvPr>
+        </p:nvPicPr>
+        <p:blipFill>
+          <a:blip r:embed="rId2">
+            <a:extLst>
+              <a:ext uri="{28A0092B-C50C-407E-A947-70E740481C1C}">
+                <a14:useLocalDpi xmlns:a14="http://schemas.microsoft.com/office/drawing/2010/main" val="0"/>
+              </a:ext>
+            </a:extLst>
+          </a:blip>
+          <a:stretch>
+            <a:fillRect/>
+          </a:stretch>
+        </p:blipFill>
+        <p:spPr>
+          <a:xfrm>
+            <a:off x="1380467" y="3014943"/>
+            <a:ext cx="9431066" cy="1162212"/>
+          </a:xfrm>
+        </p:spPr>
+      </p:pic>
+    </p:spTree>
+    <p:extLst>
+      <p:ext uri="{BB962C8B-B14F-4D97-AF65-F5344CB8AC3E}">
+        <p14:creationId xmlns:p14="http://schemas.microsoft.com/office/powerpoint/2010/main" val="1276660147"/>
+      </p:ext>
+    </p:extLst>
+  </p:cSld>
+  <p:clrMapOvr>
+    <a:masterClrMapping/>
+  </p:clrMapOvr>
+</p:sld>
+</file>
+
+<file path=ppt/slides/slide6.xml><?xml version="1.0" encoding="utf-8"?>
+<p:sld xmlns:a="http://schemas.openxmlformats.org/drawingml/2006/main" xmlns:r="http://schemas.openxmlformats.org/officeDocument/2006/relationships" xmlns:p="http://schemas.openxmlformats.org/presentationml/2006/main">
+  <p:cSld>
+    <p:spTree>
+      <p:nvGrpSpPr>
+        <p:cNvPr id="1" name=""/>
+        <p:cNvGrpSpPr/>
+        <p:nvPr/>
+      </p:nvGrpSpPr>
+      <p:grpSpPr>
+        <a:xfrm>
+          <a:off x="0" y="0"/>
+          <a:ext cx="0" cy="0"/>
+          <a:chOff x="0" y="0"/>
+          <a:chExt cx="0" cy="0"/>
+        </a:xfrm>
+      </p:grpSpPr>
+      <p:sp>
+        <p:nvSpPr>
+          <p:cNvPr id="6" name="Titel 5"/>
+          <p:cNvSpPr>
+            <a:spLocks noGrp="1"/>
+          </p:cNvSpPr>
+          <p:nvPr>
+            <p:ph type="title"/>
+          </p:nvPr>
+        </p:nvSpPr>
+        <p:spPr>
+          <a:xfrm>
+            <a:off x="1066800" y="3058767"/>
+            <a:ext cx="10233999" cy="1325563"/>
+          </a:xfrm>
+        </p:spPr>
+        <p:txBody>
+          <a:bodyPr/>
+          <a:lstStyle/>
+          <a:p>
+            <a:r>
+              <a:rPr lang="de-DE" dirty="0" err="1"/>
+              <a:t>Use</a:t>
+            </a:r>
+            <a:r>
+              <a:rPr lang="de-DE" dirty="0"/>
+              <a:t>-Case Diagramme</a:t>
+            </a:r>
+          </a:p>
+        </p:txBody>
+      </p:sp>
+      <p:sp>
+        <p:nvSpPr>
+          <p:cNvPr id="4" name="Fußzeilenplatzhalter 3"/>
+          <p:cNvSpPr>
+            <a:spLocks noGrp="1"/>
+          </p:cNvSpPr>
+          <p:nvPr>
+            <p:ph type="ftr" sz="quarter" idx="4294967295"/>
+          </p:nvPr>
+        </p:nvSpPr>
+        <p:spPr>
+          <a:xfrm>
+            <a:off x="0" y="6356350"/>
+            <a:ext cx="4114800" cy="365125"/>
+          </a:xfrm>
+        </p:spPr>
+        <p:txBody>
+          <a:bodyPr/>
+          <a:lstStyle/>
+          <a:p>
+            <a:r>
+              <a:rPr lang="de-DE">
+                <a:solidFill>
+                  <a:schemeClr val="bg1">
+                    <a:lumMod val="50000"/>
+                  </a:schemeClr>
+                </a:solidFill>
+              </a:rPr>
+              <a:t>FH-Rosenheim| Webservices Projekt| </a:t>
+            </a:r>
+            <a:r>
+              <a:rPr lang="de-DE" b="1">
+                <a:solidFill>
+                  <a:srgbClr val="9050C0"/>
+                </a:solidFill>
+              </a:rPr>
+              <a:t>Sparkly Unicorns</a:t>
+            </a:r>
+            <a:endParaRPr lang="de-DE" b="1" dirty="0">
+              <a:solidFill>
+                <a:srgbClr val="9050C0"/>
+              </a:solidFill>
+            </a:endParaRPr>
+          </a:p>
+        </p:txBody>
+      </p:sp>
+      <p:sp>
+        <p:nvSpPr>
+          <p:cNvPr id="5" name="Foliennummernplatzhalter 4"/>
+          <p:cNvSpPr>
+            <a:spLocks noGrp="1"/>
+          </p:cNvSpPr>
+          <p:nvPr>
+            <p:ph type="sldNum" sz="quarter" idx="4294967295"/>
+          </p:nvPr>
+        </p:nvSpPr>
+        <p:spPr>
+          <a:xfrm>
+            <a:off x="9448800" y="6356350"/>
+            <a:ext cx="2743200" cy="365125"/>
+          </a:xfrm>
+        </p:spPr>
+        <p:txBody>
+          <a:bodyPr/>
+          <a:lstStyle/>
+          <a:p>
+            <a:fld id="{18109C88-7B38-4154-B915-44BB12A36FA9}" type="slidenum">
+              <a:rPr lang="de-DE" smtClean="0"/>
+              <a:t>6</a:t>
+            </a:fld>
+            <a:endParaRPr lang="de-DE"/>
+          </a:p>
+        </p:txBody>
+      </p:sp>
+    </p:spTree>
+    <p:extLst>
+      <p:ext uri="{BB962C8B-B14F-4D97-AF65-F5344CB8AC3E}">
+        <p14:creationId xmlns:p14="http://schemas.microsoft.com/office/powerpoint/2010/main" val="989500410"/>
+      </p:ext>
+    </p:extLst>
+  </p:cSld>
+  <p:clrMapOvr>
+    <a:masterClrMapping/>
+  </p:clrMapOvr>
+</p:sld>
+</file>
+
+<file path=ppt/slides/slide7.xml><?xml version="1.0" encoding="utf-8"?>
 <p:sld xmlns:a="http://schemas.openxmlformats.org/drawingml/2006/main" xmlns:r="http://schemas.openxmlformats.org/officeDocument/2006/relationships" xmlns:p="http://schemas.openxmlformats.org/presentationml/2006/main">
   <p:cSld>
     <p:spTree>
@@ -4812,8 +5261,8 @@
         </p:blipFill>
         <p:spPr>
           <a:xfrm>
-            <a:off x="1456106" y="366691"/>
-            <a:ext cx="8407560" cy="5915019"/>
+            <a:off x="2463640" y="412318"/>
+            <a:ext cx="7518560" cy="5944032"/>
           </a:xfrm>
         </p:spPr>
       </p:pic>
@@ -4833,7 +5282,7 @@
           <a:lstStyle/>
           <a:p>
             <a:r>
-              <a:rPr lang="de-DE" smtClean="0">
+              <a:rPr lang="de-DE">
                 <a:solidFill>
                   <a:schemeClr val="bg1">
                     <a:lumMod val="50000"/>
@@ -4843,7 +5292,7 @@
               <a:t>FH-Rosenheim| Webservices Projekt| </a:t>
             </a:r>
             <a:r>
-              <a:rPr lang="de-DE" b="1" smtClean="0">
+              <a:rPr lang="de-DE" b="1">
                 <a:solidFill>
                   <a:srgbClr val="9050C0"/>
                 </a:solidFill>
@@ -4875,7 +5324,7 @@
           <a:p>
             <a:fld id="{18109C88-7B38-4154-B915-44BB12A36FA9}" type="slidenum">
               <a:rPr lang="de-DE" smtClean="0"/>
-              <a:t>5</a:t>
+              <a:t>7</a:t>
             </a:fld>
             <a:endParaRPr lang="de-DE"/>
           </a:p>
@@ -4884,24 +5333,17 @@
     </p:spTree>
     <p:extLst>
       <p:ext uri="{BB962C8B-B14F-4D97-AF65-F5344CB8AC3E}">
-        <p14:creationId xmlns:p14="http://schemas.microsoft.com/office/powerpoint/2010/main" val="2895843183"/>
+        <p14:creationId xmlns:p14="http://schemas.microsoft.com/office/powerpoint/2010/main" val="795551646"/>
       </p:ext>
     </p:extLst>
   </p:cSld>
   <p:clrMapOvr>
     <a:masterClrMapping/>
   </p:clrMapOvr>
-  <p:timing>
-    <p:tnLst>
-      <p:par>
-        <p:cTn id="1" dur="indefinite" restart="never" nodeType="tmRoot"/>
-      </p:par>
-    </p:tnLst>
-  </p:timing>
 </p:sld>
 </file>
 
-<file path=ppt/slides/slide6.xml><?xml version="1.0" encoding="utf-8"?>
+<file path=ppt/slides/slide8.xml><?xml version="1.0" encoding="utf-8"?>
 <p:sld xmlns:a="http://schemas.openxmlformats.org/drawingml/2006/main" xmlns:r="http://schemas.openxmlformats.org/officeDocument/2006/relationships" xmlns:p="http://schemas.openxmlformats.org/presentationml/2006/main">
   <p:cSld>
     <p:spTree>
@@ -4918,14 +5360,43 @@
           <a:chExt cx="0" cy="0"/>
         </a:xfrm>
       </p:grpSpPr>
-      <p:sp>
-        <p:nvSpPr>
-          <p:cNvPr id="2" name="Titel 1"/>
-          <p:cNvSpPr>
-            <a:spLocks noGrp="1"/>
-          </p:cNvSpPr>
-          <p:nvPr>
-            <p:ph type="title"/>
+      <p:pic>
+        <p:nvPicPr>
+          <p:cNvPr id="6" name="Inhaltsplatzhalter 5"/>
+          <p:cNvPicPr>
+            <a:picLocks noGrp="1" noChangeAspect="1"/>
+          </p:cNvPicPr>
+          <p:nvPr>
+            <p:ph idx="1"/>
+          </p:nvPr>
+        </p:nvPicPr>
+        <p:blipFill>
+          <a:blip r:embed="rId2">
+            <a:extLst>
+              <a:ext uri="{28A0092B-C50C-407E-A947-70E740481C1C}">
+                <a14:useLocalDpi xmlns:a14="http://schemas.microsoft.com/office/drawing/2010/main" val="0"/>
+              </a:ext>
+            </a:extLst>
+          </a:blip>
+          <a:stretch>
+            <a:fillRect/>
+          </a:stretch>
+        </p:blipFill>
+        <p:spPr>
+          <a:xfrm>
+            <a:off x="1456106" y="366691"/>
+            <a:ext cx="8407560" cy="5915019"/>
+          </a:xfrm>
+        </p:spPr>
+      </p:pic>
+      <p:sp>
+        <p:nvSpPr>
+          <p:cNvPr id="4" name="Fußzeilenplatzhalter 3"/>
+          <p:cNvSpPr>
+            <a:spLocks noGrp="1"/>
+          </p:cNvSpPr>
+          <p:nvPr>
+            <p:ph type="ftr" sz="quarter" idx="11"/>
           </p:nvPr>
         </p:nvSpPr>
         <p:spPr/>
@@ -4934,30 +5405,7 @@
           <a:lstStyle/>
           <a:p>
             <a:r>
-              <a:rPr lang="de-DE" dirty="0" smtClean="0"/>
-              <a:t>Dialoglandkarte</a:t>
-            </a:r>
-            <a:endParaRPr lang="de-DE" dirty="0"/>
-          </a:p>
-        </p:txBody>
-      </p:sp>
-      <p:sp>
-        <p:nvSpPr>
-          <p:cNvPr id="4" name="Fußzeilenplatzhalter 3"/>
-          <p:cNvSpPr>
-            <a:spLocks noGrp="1"/>
-          </p:cNvSpPr>
-          <p:nvPr>
-            <p:ph type="ftr" sz="quarter" idx="11"/>
-          </p:nvPr>
-        </p:nvSpPr>
-        <p:spPr/>
-        <p:txBody>
-          <a:bodyPr/>
-          <a:lstStyle/>
-          <a:p>
-            <a:r>
-              <a:rPr lang="de-DE" smtClean="0">
+              <a:rPr lang="de-DE">
                 <a:solidFill>
                   <a:schemeClr val="bg1">
                     <a:lumMod val="50000"/>
@@ -4967,7 +5415,7 @@
               <a:t>FH-Rosenheim| Webservices Projekt| </a:t>
             </a:r>
             <a:r>
-              <a:rPr lang="de-DE" b="1" smtClean="0">
+              <a:rPr lang="de-DE" b="1">
                 <a:solidFill>
                   <a:srgbClr val="9050C0"/>
                 </a:solidFill>
@@ -4999,7 +5447,148 @@
           <a:p>
             <a:fld id="{18109C88-7B38-4154-B915-44BB12A36FA9}" type="slidenum">
               <a:rPr lang="de-DE" smtClean="0"/>
-              <a:t>6</a:t>
+              <a:t>8</a:t>
+            </a:fld>
+            <a:endParaRPr lang="de-DE"/>
+          </a:p>
+        </p:txBody>
+      </p:sp>
+      <p:pic>
+        <p:nvPicPr>
+          <p:cNvPr id="3" name="Picture 2"/>
+          <p:cNvPicPr>
+            <a:picLocks noChangeAspect="1"/>
+          </p:cNvPicPr>
+          <p:nvPr/>
+        </p:nvPicPr>
+        <p:blipFill>
+          <a:blip r:embed="rId3"/>
+          <a:stretch>
+            <a:fillRect/>
+          </a:stretch>
+        </p:blipFill>
+        <p:spPr>
+          <a:xfrm>
+            <a:off x="0" y="0"/>
+            <a:ext cx="12192000" cy="6858000"/>
+          </a:xfrm>
+          <a:prstGeom prst="rect">
+            <a:avLst/>
+          </a:prstGeom>
+          <a:noFill/>
+        </p:spPr>
+      </p:pic>
+    </p:spTree>
+    <p:extLst>
+      <p:ext uri="{BB962C8B-B14F-4D97-AF65-F5344CB8AC3E}">
+        <p14:creationId xmlns:p14="http://schemas.microsoft.com/office/powerpoint/2010/main" val="2895843183"/>
+      </p:ext>
+    </p:extLst>
+  </p:cSld>
+  <p:clrMapOvr>
+    <a:masterClrMapping/>
+  </p:clrMapOvr>
+</p:sld>
+</file>
+
+<file path=ppt/slides/slide9.xml><?xml version="1.0" encoding="utf-8"?>
+<p:sld xmlns:a="http://schemas.openxmlformats.org/drawingml/2006/main" xmlns:r="http://schemas.openxmlformats.org/officeDocument/2006/relationships" xmlns:p="http://schemas.openxmlformats.org/presentationml/2006/main">
+  <p:cSld>
+    <p:spTree>
+      <p:nvGrpSpPr>
+        <p:cNvPr id="1" name=""/>
+        <p:cNvGrpSpPr/>
+        <p:nvPr/>
+      </p:nvGrpSpPr>
+      <p:grpSpPr>
+        <a:xfrm>
+          <a:off x="0" y="0"/>
+          <a:ext cx="0" cy="0"/>
+          <a:chOff x="0" y="0"/>
+          <a:chExt cx="0" cy="0"/>
+        </a:xfrm>
+      </p:grpSpPr>
+      <p:sp>
+        <p:nvSpPr>
+          <p:cNvPr id="2" name="Titel 1"/>
+          <p:cNvSpPr>
+            <a:spLocks noGrp="1"/>
+          </p:cNvSpPr>
+          <p:nvPr>
+            <p:ph type="title"/>
+          </p:nvPr>
+        </p:nvSpPr>
+        <p:spPr/>
+        <p:txBody>
+          <a:bodyPr/>
+          <a:lstStyle/>
+          <a:p>
+            <a:r>
+              <a:rPr lang="de-DE" dirty="0"/>
+              <a:t>Dialoglandkarte</a:t>
+            </a:r>
+          </a:p>
+        </p:txBody>
+      </p:sp>
+      <p:sp>
+        <p:nvSpPr>
+          <p:cNvPr id="4" name="Fußzeilenplatzhalter 3"/>
+          <p:cNvSpPr>
+            <a:spLocks noGrp="1"/>
+          </p:cNvSpPr>
+          <p:nvPr>
+            <p:ph type="ftr" sz="quarter" idx="11"/>
+          </p:nvPr>
+        </p:nvSpPr>
+        <p:spPr/>
+        <p:txBody>
+          <a:bodyPr/>
+          <a:lstStyle/>
+          <a:p>
+            <a:r>
+              <a:rPr lang="de-DE">
+                <a:solidFill>
+                  <a:schemeClr val="bg1">
+                    <a:lumMod val="50000"/>
+                  </a:schemeClr>
+                </a:solidFill>
+              </a:rPr>
+              <a:t>FH-Rosenheim| Webservices Projekt| </a:t>
+            </a:r>
+            <a:r>
+              <a:rPr lang="de-DE" b="1">
+                <a:solidFill>
+                  <a:srgbClr val="9050C0"/>
+                </a:solidFill>
+              </a:rPr>
+              <a:t>Sparkly Unicorns</a:t>
+            </a:r>
+            <a:endParaRPr lang="de-DE" b="1" dirty="0">
+              <a:solidFill>
+                <a:srgbClr val="9050C0"/>
+              </a:solidFill>
+            </a:endParaRPr>
+          </a:p>
+        </p:txBody>
+      </p:sp>
+      <p:sp>
+        <p:nvSpPr>
+          <p:cNvPr id="5" name="Foliennummernplatzhalter 4"/>
+          <p:cNvSpPr>
+            <a:spLocks noGrp="1"/>
+          </p:cNvSpPr>
+          <p:nvPr>
+            <p:ph type="sldNum" sz="quarter" idx="12"/>
+          </p:nvPr>
+        </p:nvSpPr>
+        <p:spPr/>
+        <p:txBody>
+          <a:bodyPr/>
+          <a:lstStyle/>
+          <a:p>
+            <a:fld id="{18109C88-7B38-4154-B915-44BB12A36FA9}" type="slidenum">
+              <a:rPr lang="de-DE" smtClean="0"/>
+              <a:t>9</a:t>
             </a:fld>
             <a:endParaRPr lang="de-DE"/>
           </a:p>
@@ -5513,143 +6102,6 @@
   <p:clrMapOvr>
     <a:masterClrMapping/>
   </p:clrMapOvr>
-  <p:timing>
-    <p:tnLst>
-      <p:par>
-        <p:cTn id="1" dur="indefinite" restart="never" nodeType="tmRoot"/>
-      </p:par>
-    </p:tnLst>
-  </p:timing>
-</p:sld>
-</file>
-
-<file path=ppt/slides/slide7.xml><?xml version="1.0" encoding="utf-8"?>
-<p:sld xmlns:a="http://schemas.openxmlformats.org/drawingml/2006/main" xmlns:r="http://schemas.openxmlformats.org/officeDocument/2006/relationships" xmlns:p="http://schemas.openxmlformats.org/presentationml/2006/main">
-  <p:cSld>
-    <p:spTree>
-      <p:nvGrpSpPr>
-        <p:cNvPr id="1" name=""/>
-        <p:cNvGrpSpPr/>
-        <p:nvPr/>
-      </p:nvGrpSpPr>
-      <p:grpSpPr>
-        <a:xfrm>
-          <a:off x="0" y="0"/>
-          <a:ext cx="0" cy="0"/>
-          <a:chOff x="0" y="0"/>
-          <a:chExt cx="0" cy="0"/>
-        </a:xfrm>
-      </p:grpSpPr>
-      <p:pic>
-        <p:nvPicPr>
-          <p:cNvPr id="7" name="Inhaltsplatzhalter 6"/>
-          <p:cNvPicPr>
-            <a:picLocks noGrp="1" noChangeAspect="1"/>
-          </p:cNvPicPr>
-          <p:nvPr>
-            <p:ph idx="1"/>
-          </p:nvPr>
-        </p:nvPicPr>
-        <p:blipFill>
-          <a:blip r:embed="rId3">
-            <a:extLst>
-              <a:ext uri="{28A0092B-C50C-407E-A947-70E740481C1C}">
-                <a14:useLocalDpi xmlns:a14="http://schemas.microsoft.com/office/drawing/2010/main" val="0"/>
-              </a:ext>
-            </a:extLst>
-          </a:blip>
-          <a:stretch>
-            <a:fillRect/>
-          </a:stretch>
-        </p:blipFill>
-        <p:spPr>
-          <a:xfrm>
-            <a:off x="1842381" y="170358"/>
-            <a:ext cx="8262203" cy="5694313"/>
-          </a:xfrm>
-        </p:spPr>
-      </p:pic>
-      <p:sp>
-        <p:nvSpPr>
-          <p:cNvPr id="4" name="Fußzeilenplatzhalter 3"/>
-          <p:cNvSpPr>
-            <a:spLocks noGrp="1"/>
-          </p:cNvSpPr>
-          <p:nvPr>
-            <p:ph type="ftr" sz="quarter" idx="11"/>
-          </p:nvPr>
-        </p:nvSpPr>
-        <p:spPr/>
-        <p:txBody>
-          <a:bodyPr/>
-          <a:lstStyle/>
-          <a:p>
-            <a:r>
-              <a:rPr lang="de-DE" smtClean="0">
-                <a:solidFill>
-                  <a:schemeClr val="bg1">
-                    <a:lumMod val="50000"/>
-                  </a:schemeClr>
-                </a:solidFill>
-              </a:rPr>
-              <a:t>FH-Rosenheim| Webservices Projekt| </a:t>
-            </a:r>
-            <a:r>
-              <a:rPr lang="de-DE" b="1" smtClean="0">
-                <a:solidFill>
-                  <a:srgbClr val="9050C0"/>
-                </a:solidFill>
-              </a:rPr>
-              <a:t>Sparkly Unicorns</a:t>
-            </a:r>
-            <a:endParaRPr lang="de-DE" b="1" dirty="0">
-              <a:solidFill>
-                <a:srgbClr val="9050C0"/>
-              </a:solidFill>
-            </a:endParaRPr>
-          </a:p>
-        </p:txBody>
-      </p:sp>
-      <p:sp>
-        <p:nvSpPr>
-          <p:cNvPr id="5" name="Foliennummernplatzhalter 4"/>
-          <p:cNvSpPr>
-            <a:spLocks noGrp="1"/>
-          </p:cNvSpPr>
-          <p:nvPr>
-            <p:ph type="sldNum" sz="quarter" idx="12"/>
-          </p:nvPr>
-        </p:nvSpPr>
-        <p:spPr/>
-        <p:txBody>
-          <a:bodyPr/>
-          <a:lstStyle/>
-          <a:p>
-            <a:fld id="{18109C88-7B38-4154-B915-44BB12A36FA9}" type="slidenum">
-              <a:rPr lang="de-DE" smtClean="0"/>
-              <a:t>7</a:t>
-            </a:fld>
-            <a:endParaRPr lang="de-DE"/>
-          </a:p>
-        </p:txBody>
-      </p:sp>
-    </p:spTree>
-    <p:extLst>
-      <p:ext uri="{BB962C8B-B14F-4D97-AF65-F5344CB8AC3E}">
-        <p14:creationId xmlns:p14="http://schemas.microsoft.com/office/powerpoint/2010/main" val="155766070"/>
-      </p:ext>
-    </p:extLst>
-  </p:cSld>
-  <p:clrMapOvr>
-    <a:masterClrMapping/>
-  </p:clrMapOvr>
-  <p:timing>
-    <p:tnLst>
-      <p:par>
-        <p:cTn id="1" dur="indefinite" restart="never" nodeType="tmRoot"/>
-      </p:par>
-    </p:tnLst>
-  </p:timing>
 </p:sld>
 </file>
 

</xml_diff>